<commit_message>
Added MiRo touch control python code
</commit_message>
<xml_diff>
--- a/MIRO_setup.pptx
+++ b/MIRO_setup.pptx
@@ -8155,7 +8155,47 @@
                 <a:ea typeface="Apple Symbols" charset="0"/>
                 <a:cs typeface="Apple Symbols" charset="0"/>
               </a:rPr>
-              <a:t>ln -s ~/lib/mdk-170906 ~/mdk </a:t>
+              <a:t>ln -s ~/</a:t>
+            </a:r>
+            <a:r>
+              <a:rPr lang="mr-IN" sz="1600" dirty="0" err="1" smtClean="0">
+                <a:latin typeface="Apple Symbols" charset="0"/>
+                <a:ea typeface="Apple Symbols" charset="0"/>
+                <a:cs typeface="Apple Symbols" charset="0"/>
+              </a:rPr>
+              <a:t>lib</a:t>
+            </a:r>
+            <a:r>
+              <a:rPr lang="mr-IN" sz="1600" dirty="0" smtClean="0">
+                <a:latin typeface="Apple Symbols" charset="0"/>
+                <a:ea typeface="Apple Symbols" charset="0"/>
+                <a:cs typeface="Apple Symbols" charset="0"/>
+              </a:rPr>
+              <a:t>/mdk-1</a:t>
+            </a:r>
+            <a:r>
+              <a:rPr lang="en-US" sz="1600" smtClean="0">
+                <a:latin typeface="Apple Symbols" charset="0"/>
+                <a:ea typeface="Apple Symbols" charset="0"/>
+                <a:cs typeface="Apple Symbols" charset="0"/>
+              </a:rPr>
+              <a:t>80509</a:t>
+            </a:r>
+            <a:r>
+              <a:rPr lang="mr-IN" sz="1600" smtClean="0">
+                <a:latin typeface="Apple Symbols" charset="0"/>
+                <a:ea typeface="Apple Symbols" charset="0"/>
+                <a:cs typeface="Apple Symbols" charset="0"/>
+              </a:rPr>
+              <a:t> </a:t>
+            </a:r>
+            <a:r>
+              <a:rPr lang="mr-IN" sz="1600" dirty="0">
+                <a:latin typeface="Apple Symbols" charset="0"/>
+                <a:ea typeface="Apple Symbols" charset="0"/>
+                <a:cs typeface="Apple Symbols" charset="0"/>
+              </a:rPr>
+              <a:t>~/mdk </a:t>
             </a:r>
             <a:endParaRPr lang="en-US" sz="1600" dirty="0" smtClean="0">
               <a:latin typeface="Apple Symbols" charset="0"/>

</xml_diff>

<commit_message>
MIRO_setup and readme updated.
</commit_message>
<xml_diff>
--- a/MIRO_setup.pptx
+++ b/MIRO_setup.pptx
@@ -12,12 +12,13 @@
     <p:sldId id="258" r:id="rId6"/>
     <p:sldId id="259" r:id="rId7"/>
     <p:sldId id="260" r:id="rId8"/>
-    <p:sldId id="261" r:id="rId9"/>
-    <p:sldId id="264" r:id="rId10"/>
-    <p:sldId id="265" r:id="rId11"/>
-    <p:sldId id="266" r:id="rId12"/>
-    <p:sldId id="267" r:id="rId13"/>
-    <p:sldId id="268" r:id="rId14"/>
+    <p:sldId id="271" r:id="rId9"/>
+    <p:sldId id="261" r:id="rId10"/>
+    <p:sldId id="264" r:id="rId11"/>
+    <p:sldId id="265" r:id="rId12"/>
+    <p:sldId id="266" r:id="rId13"/>
+    <p:sldId id="267" r:id="rId14"/>
+    <p:sldId id="268" r:id="rId15"/>
   </p:sldIdLst>
   <p:sldSz cx="9144000" cy="6858000" type="screen4x3"/>
   <p:notesSz cx="6858000" cy="9144000"/>
@@ -329,7 +330,7 @@
             <a:fld id="{451DEABC-D766-4322-8E78-B830FAE35C72}" type="datetime4">
               <a:rPr lang="en-US" smtClean="0"/>
               <a:pPr/>
-              <a:t>November 6, 2018</a:t>
+              <a:t>November 7, 2018</a:t>
             </a:fld>
             <a:endParaRPr lang="en-US" dirty="0"/>
           </a:p>
@@ -596,7 +597,7 @@
             <a:fld id="{F3131F9E-604E-4343-9F29-EF72E8231CAD}" type="datetime4">
               <a:rPr lang="en-US" smtClean="0"/>
               <a:pPr/>
-              <a:t>November 6, 2018</a:t>
+              <a:t>November 7, 2018</a:t>
             </a:fld>
             <a:endParaRPr lang="en-US"/>
           </a:p>
@@ -773,7 +774,7 @@
             <a:fld id="{34A8E1CE-37F8-4102-8DF9-852A0A51F293}" type="datetime4">
               <a:rPr lang="en-US" smtClean="0"/>
               <a:pPr/>
-              <a:t>November 6, 2018</a:t>
+              <a:t>November 7, 2018</a:t>
             </a:fld>
             <a:endParaRPr lang="en-US"/>
           </a:p>
@@ -940,7 +941,7 @@
             <a:fld id="{93333F43-3E86-47E4-BFBB-2476D384E1C6}" type="datetime4">
               <a:rPr lang="en-US" smtClean="0"/>
               <a:pPr/>
-              <a:t>November 6, 2018</a:t>
+              <a:t>November 7, 2018</a:t>
             </a:fld>
             <a:endParaRPr lang="en-US"/>
           </a:p>
@@ -1191,7 +1192,7 @@
             <a:fld id="{751663BA-01FC-4367-B6F3-ABB2645D55F1}" type="datetime4">
               <a:rPr lang="en-US" smtClean="0"/>
               <a:pPr/>
-              <a:t>November 6, 2018</a:t>
+              <a:t>November 7, 2018</a:t>
             </a:fld>
             <a:endParaRPr lang="en-US" dirty="0"/>
           </a:p>
@@ -1476,7 +1477,7 @@
             <a:fld id="{79B19C71-EC74-44AF-B27E-FC7DC3C3A61D}" type="datetime4">
               <a:rPr lang="en-US" smtClean="0"/>
               <a:pPr/>
-              <a:t>November 6, 2018</a:t>
+              <a:t>November 7, 2018</a:t>
             </a:fld>
             <a:endParaRPr lang="en-US"/>
           </a:p>
@@ -1917,7 +1918,7 @@
             <a:fld id="{6A5CDA29-3CBE-48EA-92AE-A996835462BA}" type="datetime4">
               <a:rPr lang="en-US" smtClean="0"/>
               <a:pPr/>
-              <a:t>November 6, 2018</a:t>
+              <a:t>November 7, 2018</a:t>
             </a:fld>
             <a:endParaRPr lang="en-US"/>
           </a:p>
@@ -2032,7 +2033,7 @@
             <a:fld id="{E29EC054-3869-4501-B163-1BBFDE8DCE04}" type="datetime4">
               <a:rPr lang="en-US" smtClean="0"/>
               <a:pPr/>
-              <a:t>November 6, 2018</a:t>
+              <a:t>November 7, 2018</a:t>
             </a:fld>
             <a:endParaRPr lang="en-US"/>
           </a:p>
@@ -2124,7 +2125,7 @@
             <a:fld id="{0A63D831-56C1-49CF-8EF7-8B9A98402BCD}" type="datetime4">
               <a:rPr lang="en-US" smtClean="0"/>
               <a:pPr/>
-              <a:t>November 6, 2018</a:t>
+              <a:t>November 7, 2018</a:t>
             </a:fld>
             <a:endParaRPr lang="en-US"/>
           </a:p>
@@ -2368,7 +2369,7 @@
             <a:fld id="{6EAD5615-7F4F-4584-84D5-CC95918C321F}" type="datetime4">
               <a:rPr lang="en-US" smtClean="0"/>
               <a:pPr/>
-              <a:t>November 6, 2018</a:t>
+              <a:t>November 7, 2018</a:t>
             </a:fld>
             <a:endParaRPr lang="en-US"/>
           </a:p>
@@ -2664,7 +2665,7 @@
             <a:fld id="{76EEA923-9BEE-48CE-9F28-5B525F399BAD}" type="datetime4">
               <a:rPr lang="en-US" smtClean="0"/>
               <a:pPr/>
-              <a:t>November 6, 2018</a:t>
+              <a:t>November 7, 2018</a:t>
             </a:fld>
             <a:endParaRPr lang="en-US"/>
           </a:p>
@@ -2960,7 +2961,7 @@
             <a:fld id="{17D0EFEE-2756-4A20-BF2A-63F0A94F99AC}" type="datetime4">
               <a:rPr lang="en-US" smtClean="0"/>
               <a:pPr/>
-              <a:t>November 6, 2018</a:t>
+              <a:t>November 7, 2018</a:t>
             </a:fld>
             <a:endParaRPr lang="en-US" dirty="0"/>
           </a:p>
@@ -3566,7 +3567,7 @@
           <p:cNvPr id="8" name="Picture 7">
             <a:extLst>
               <a:ext uri="{FF2B5EF4-FFF2-40B4-BE49-F238E27FC236}">
-                <a16:creationId xmlns="" xmlns:a16="http://schemas.microsoft.com/office/drawing/2014/main" id="{0672F0F0-8A82-EC43-97DA-29D5ECDC6BA7}"/>
+                <a16:creationId xmlns:a16="http://schemas.microsoft.com/office/drawing/2014/main" xmlns="" id="{0672F0F0-8A82-EC43-97DA-29D5ECDC6BA7}"/>
               </a:ext>
             </a:extLst>
           </p:cNvPr>
@@ -3596,7 +3597,7 @@
           <p:cNvPr id="9" name="Picture 8">
             <a:extLst>
               <a:ext uri="{FF2B5EF4-FFF2-40B4-BE49-F238E27FC236}">
-                <a16:creationId xmlns="" xmlns:a16="http://schemas.microsoft.com/office/drawing/2014/main" id="{5612A9FE-633F-B34E-9178-6D5B33E34C3C}"/>
+                <a16:creationId xmlns:a16="http://schemas.microsoft.com/office/drawing/2014/main" xmlns="" id="{5612A9FE-633F-B34E-9178-6D5B33E34C3C}"/>
               </a:ext>
             </a:extLst>
           </p:cNvPr>
@@ -3676,6 +3677,1406 @@
 </file>
 
 <file path=ppt/slides/slide10.xml><?xml version="1.0" encoding="utf-8"?>
+<p:sld xmlns:a="http://schemas.openxmlformats.org/drawingml/2006/main" xmlns:r="http://schemas.openxmlformats.org/officeDocument/2006/relationships" xmlns:p="http://schemas.openxmlformats.org/presentationml/2006/main">
+  <p:cSld>
+    <p:spTree>
+      <p:nvGrpSpPr>
+        <p:cNvPr id="1" name=""/>
+        <p:cNvGrpSpPr/>
+        <p:nvPr/>
+      </p:nvGrpSpPr>
+      <p:grpSpPr>
+        <a:xfrm>
+          <a:off x="0" y="0"/>
+          <a:ext cx="0" cy="0"/>
+          <a:chOff x="0" y="0"/>
+          <a:chExt cx="0" cy="0"/>
+        </a:xfrm>
+      </p:grpSpPr>
+      <p:sp>
+        <p:nvSpPr>
+          <p:cNvPr id="6" name="Content Placeholder 3"/>
+          <p:cNvSpPr txBox="1">
+            <a:spLocks/>
+          </p:cNvSpPr>
+          <p:nvPr/>
+        </p:nvSpPr>
+        <p:spPr>
+          <a:xfrm>
+            <a:off x="457195" y="2484832"/>
+            <a:ext cx="7620000" cy="577826"/>
+          </a:xfrm>
+          <a:prstGeom prst="rect">
+            <a:avLst/>
+          </a:prstGeom>
+        </p:spPr>
+        <p:txBody>
+          <a:bodyPr vert="horz" lIns="91440" tIns="45720" rIns="91440" bIns="45720" rtlCol="0">
+            <a:normAutofit/>
+          </a:bodyPr>
+          <a:lstStyle>
+            <a:lvl1pPr marL="0" indent="0" algn="l" defTabSz="914400" rtl="0" eaLnBrk="1" latinLnBrk="0" hangingPunct="1">
+              <a:spcBef>
+                <a:spcPct val="20000"/>
+              </a:spcBef>
+              <a:spcAft>
+                <a:spcPts val="600"/>
+              </a:spcAft>
+              <a:buFont typeface="Arial" pitchFamily="34" charset="0"/>
+              <a:buNone/>
+              <a:defRPr sz="2000" b="1" kern="1200">
+                <a:solidFill>
+                  <a:schemeClr val="tx1"/>
+                </a:solidFill>
+                <a:latin typeface="+mn-lt"/>
+                <a:ea typeface="+mn-ea"/>
+                <a:cs typeface="+mn-cs"/>
+              </a:defRPr>
+            </a:lvl1pPr>
+            <a:lvl2pPr marL="457200" indent="-182880" algn="l" defTabSz="914400" rtl="0" eaLnBrk="1" latinLnBrk="0" hangingPunct="1">
+              <a:spcBef>
+                <a:spcPct val="20000"/>
+              </a:spcBef>
+              <a:buClr>
+                <a:schemeClr val="tx2"/>
+              </a:buClr>
+              <a:buFont typeface="Arial" pitchFamily="34" charset="0"/>
+              <a:buChar char="•"/>
+              <a:defRPr sz="2000" kern="1200">
+                <a:solidFill>
+                  <a:schemeClr val="tx1"/>
+                </a:solidFill>
+                <a:latin typeface="+mn-lt"/>
+                <a:ea typeface="+mn-ea"/>
+                <a:cs typeface="+mn-cs"/>
+              </a:defRPr>
+            </a:lvl2pPr>
+            <a:lvl3pPr marL="1143000" indent="-228600" algn="l" defTabSz="914400" rtl="0" eaLnBrk="1" latinLnBrk="0" hangingPunct="1">
+              <a:spcBef>
+                <a:spcPct val="20000"/>
+              </a:spcBef>
+              <a:buClr>
+                <a:schemeClr val="tx2"/>
+              </a:buClr>
+              <a:buFont typeface="Arial" pitchFamily="34" charset="0"/>
+              <a:buChar char="•"/>
+              <a:defRPr sz="1800" kern="1200">
+                <a:solidFill>
+                  <a:schemeClr val="tx1"/>
+                </a:solidFill>
+                <a:latin typeface="+mn-lt"/>
+                <a:ea typeface="+mn-ea"/>
+                <a:cs typeface="+mn-cs"/>
+              </a:defRPr>
+            </a:lvl3pPr>
+            <a:lvl4pPr marL="1600200" indent="-228600" algn="l" defTabSz="914400" rtl="0" eaLnBrk="1" latinLnBrk="0" hangingPunct="1">
+              <a:spcBef>
+                <a:spcPct val="20000"/>
+              </a:spcBef>
+              <a:buClr>
+                <a:schemeClr val="tx2"/>
+              </a:buClr>
+              <a:buFont typeface="Arial" pitchFamily="34" charset="0"/>
+              <a:buChar char="•"/>
+              <a:defRPr sz="1800" kern="1200">
+                <a:solidFill>
+                  <a:schemeClr val="tx1"/>
+                </a:solidFill>
+                <a:latin typeface="+mn-lt"/>
+                <a:ea typeface="+mn-ea"/>
+                <a:cs typeface="+mn-cs"/>
+              </a:defRPr>
+            </a:lvl4pPr>
+            <a:lvl5pPr marL="2057400" indent="-228600" algn="l" defTabSz="914400" rtl="0" eaLnBrk="1" latinLnBrk="0" hangingPunct="1">
+              <a:spcBef>
+                <a:spcPct val="20000"/>
+              </a:spcBef>
+              <a:buClr>
+                <a:schemeClr val="tx2"/>
+              </a:buClr>
+              <a:buFont typeface="Arial" pitchFamily="34" charset="0"/>
+              <a:buChar char="•"/>
+              <a:defRPr sz="1800" kern="1200" baseline="0">
+                <a:solidFill>
+                  <a:schemeClr val="tx1"/>
+                </a:solidFill>
+                <a:latin typeface="+mn-lt"/>
+                <a:ea typeface="+mn-ea"/>
+                <a:cs typeface="+mn-cs"/>
+              </a:defRPr>
+            </a:lvl5pPr>
+            <a:lvl6pPr marL="2514600" indent="-228600" algn="l" defTabSz="914400" rtl="0" eaLnBrk="1" latinLnBrk="0" hangingPunct="1">
+              <a:spcBef>
+                <a:spcPct val="20000"/>
+              </a:spcBef>
+              <a:buClr>
+                <a:schemeClr val="tx2"/>
+              </a:buClr>
+              <a:buFont typeface="Arial" pitchFamily="34" charset="0"/>
+              <a:buChar char="•"/>
+              <a:defRPr sz="1600" kern="1200">
+                <a:solidFill>
+                  <a:schemeClr val="tx1"/>
+                </a:solidFill>
+                <a:latin typeface="+mn-lt"/>
+                <a:ea typeface="+mn-ea"/>
+                <a:cs typeface="+mn-cs"/>
+              </a:defRPr>
+            </a:lvl6pPr>
+            <a:lvl7pPr marL="2971800" indent="-228600" algn="l" defTabSz="914400" rtl="0" eaLnBrk="1" latinLnBrk="0" hangingPunct="1">
+              <a:spcBef>
+                <a:spcPct val="20000"/>
+              </a:spcBef>
+              <a:buClr>
+                <a:schemeClr val="tx2"/>
+              </a:buClr>
+              <a:buFont typeface="Arial" pitchFamily="34" charset="0"/>
+              <a:buChar char="•"/>
+              <a:defRPr sz="1600" kern="1200">
+                <a:solidFill>
+                  <a:schemeClr val="tx1"/>
+                </a:solidFill>
+                <a:latin typeface="+mn-lt"/>
+                <a:ea typeface="+mn-ea"/>
+                <a:cs typeface="+mn-cs"/>
+              </a:defRPr>
+            </a:lvl7pPr>
+            <a:lvl8pPr marL="3429000" indent="-228600" algn="l" defTabSz="914400" rtl="0" eaLnBrk="1" latinLnBrk="0" hangingPunct="1">
+              <a:spcBef>
+                <a:spcPct val="20000"/>
+              </a:spcBef>
+              <a:buClr>
+                <a:schemeClr val="tx2"/>
+              </a:buClr>
+              <a:buFont typeface="Arial" pitchFamily="34" charset="0"/>
+              <a:buChar char="•"/>
+              <a:defRPr sz="1600" kern="1200">
+                <a:solidFill>
+                  <a:schemeClr val="tx1"/>
+                </a:solidFill>
+                <a:latin typeface="+mn-lt"/>
+                <a:ea typeface="+mn-ea"/>
+                <a:cs typeface="+mn-cs"/>
+              </a:defRPr>
+            </a:lvl8pPr>
+            <a:lvl9pPr marL="3886200" indent="-228600" algn="l" defTabSz="914400" rtl="0" eaLnBrk="1" latinLnBrk="0" hangingPunct="1">
+              <a:spcBef>
+                <a:spcPct val="20000"/>
+              </a:spcBef>
+              <a:buClr>
+                <a:schemeClr val="tx2"/>
+              </a:buClr>
+              <a:buFont typeface="Arial" pitchFamily="34" charset="0"/>
+              <a:buChar char="•"/>
+              <a:defRPr sz="1600" kern="1200">
+                <a:solidFill>
+                  <a:schemeClr val="tx1"/>
+                </a:solidFill>
+                <a:latin typeface="+mn-lt"/>
+                <a:ea typeface="+mn-ea"/>
+                <a:cs typeface="+mn-cs"/>
+              </a:defRPr>
+            </a:lvl9pPr>
+          </a:lstStyle>
+          <a:p>
+            <a:pPr marL="285750" indent="-285750">
+              <a:buFont typeface="Arial"/>
+              <a:buChar char="•"/>
+            </a:pPr>
+            <a:r>
+              <a:rPr lang="en-US" b="0" dirty="0" smtClean="0">
+                <a:latin typeface="Calibri" charset="0"/>
+                <a:ea typeface="Calibri" charset="0"/>
+                <a:cs typeface="Calibri" charset="0"/>
+              </a:rPr>
+              <a:t>In your workstation: open a new terminal window and type in:</a:t>
+            </a:r>
+          </a:p>
+        </p:txBody>
+      </p:sp>
+      <p:sp>
+        <p:nvSpPr>
+          <p:cNvPr id="7" name="TextBox 6"/>
+          <p:cNvSpPr txBox="1"/>
+          <p:nvPr/>
+        </p:nvSpPr>
+        <p:spPr>
+          <a:xfrm>
+            <a:off x="771629" y="2771877"/>
+            <a:ext cx="5124898" cy="338554"/>
+          </a:xfrm>
+          <a:prstGeom prst="rect">
+            <a:avLst/>
+          </a:prstGeom>
+          <a:noFill/>
+        </p:spPr>
+        <p:txBody>
+          <a:bodyPr wrap="square" rtlCol="0">
+            <a:spAutoFit/>
+          </a:bodyPr>
+          <a:lstStyle/>
+          <a:p>
+            <a:r>
+              <a:rPr lang="en-US" sz="1600" dirty="0" smtClean="0">
+                <a:latin typeface="Apple Symbols" charset="0"/>
+                <a:ea typeface="Apple Symbols" charset="0"/>
+                <a:cs typeface="Apple Symbols" charset="0"/>
+              </a:rPr>
+              <a:t>$ </a:t>
+            </a:r>
+            <a:r>
+              <a:rPr lang="en-US" sz="1600" dirty="0" err="1">
+                <a:latin typeface="Apple Symbols" charset="0"/>
+                <a:ea typeface="Apple Symbols" charset="0"/>
+                <a:cs typeface="Apple Symbols" charset="0"/>
+              </a:rPr>
+              <a:t>ssh</a:t>
+            </a:r>
+            <a:r>
+              <a:rPr lang="en-US" sz="1600" dirty="0">
+                <a:latin typeface="Apple Symbols" charset="0"/>
+                <a:ea typeface="Apple Symbols" charset="0"/>
+                <a:cs typeface="Apple Symbols" charset="0"/>
+              </a:rPr>
+              <a:t> root@&lt;</a:t>
+            </a:r>
+            <a:r>
+              <a:rPr lang="en-US" sz="1600" dirty="0" err="1">
+                <a:latin typeface="Apple Symbols" charset="0"/>
+                <a:ea typeface="Apple Symbols" charset="0"/>
+                <a:cs typeface="Apple Symbols" charset="0"/>
+              </a:rPr>
+              <a:t>Put_Here_IP_Of_MIRO_Found_In_Android_App</a:t>
+            </a:r>
+            <a:r>
+              <a:rPr lang="en-US" sz="1600" dirty="0">
+                <a:latin typeface="Apple Symbols" charset="0"/>
+                <a:ea typeface="Apple Symbols" charset="0"/>
+                <a:cs typeface="Apple Symbols" charset="0"/>
+              </a:rPr>
+              <a:t>&gt;</a:t>
+            </a:r>
+            <a:endParaRPr lang="en-US" sz="1600" dirty="0" smtClean="0">
+              <a:latin typeface="Apple Symbols" charset="0"/>
+              <a:ea typeface="Apple Symbols" charset="0"/>
+              <a:cs typeface="Apple Symbols" charset="0"/>
+            </a:endParaRPr>
+          </a:p>
+        </p:txBody>
+      </p:sp>
+      <p:sp>
+        <p:nvSpPr>
+          <p:cNvPr id="8" name="Content Placeholder 3"/>
+          <p:cNvSpPr txBox="1">
+            <a:spLocks/>
+          </p:cNvSpPr>
+          <p:nvPr/>
+        </p:nvSpPr>
+        <p:spPr>
+          <a:xfrm>
+            <a:off x="457195" y="2175508"/>
+            <a:ext cx="7620000" cy="358164"/>
+          </a:xfrm>
+          <a:prstGeom prst="rect">
+            <a:avLst/>
+          </a:prstGeom>
+        </p:spPr>
+        <p:txBody>
+          <a:bodyPr vert="horz" lIns="91440" tIns="45720" rIns="91440" bIns="45720" rtlCol="0">
+            <a:normAutofit fontScale="92500" lnSpcReduction="10000"/>
+          </a:bodyPr>
+          <a:lstStyle>
+            <a:lvl1pPr marL="0" indent="0" algn="l" defTabSz="914400" rtl="0" eaLnBrk="1" latinLnBrk="0" hangingPunct="1">
+              <a:spcBef>
+                <a:spcPct val="20000"/>
+              </a:spcBef>
+              <a:spcAft>
+                <a:spcPts val="600"/>
+              </a:spcAft>
+              <a:buFont typeface="Arial" pitchFamily="34" charset="0"/>
+              <a:buNone/>
+              <a:defRPr sz="2000" b="1" kern="1200">
+                <a:solidFill>
+                  <a:schemeClr val="tx1"/>
+                </a:solidFill>
+                <a:latin typeface="+mn-lt"/>
+                <a:ea typeface="+mn-ea"/>
+                <a:cs typeface="+mn-cs"/>
+              </a:defRPr>
+            </a:lvl1pPr>
+            <a:lvl2pPr marL="457200" indent="-182880" algn="l" defTabSz="914400" rtl="0" eaLnBrk="1" latinLnBrk="0" hangingPunct="1">
+              <a:spcBef>
+                <a:spcPct val="20000"/>
+              </a:spcBef>
+              <a:buClr>
+                <a:schemeClr val="tx2"/>
+              </a:buClr>
+              <a:buFont typeface="Arial" pitchFamily="34" charset="0"/>
+              <a:buChar char="•"/>
+              <a:defRPr sz="2000" kern="1200">
+                <a:solidFill>
+                  <a:schemeClr val="tx1"/>
+                </a:solidFill>
+                <a:latin typeface="+mn-lt"/>
+                <a:ea typeface="+mn-ea"/>
+                <a:cs typeface="+mn-cs"/>
+              </a:defRPr>
+            </a:lvl2pPr>
+            <a:lvl3pPr marL="1143000" indent="-228600" algn="l" defTabSz="914400" rtl="0" eaLnBrk="1" latinLnBrk="0" hangingPunct="1">
+              <a:spcBef>
+                <a:spcPct val="20000"/>
+              </a:spcBef>
+              <a:buClr>
+                <a:schemeClr val="tx2"/>
+              </a:buClr>
+              <a:buFont typeface="Arial" pitchFamily="34" charset="0"/>
+              <a:buChar char="•"/>
+              <a:defRPr sz="1800" kern="1200">
+                <a:solidFill>
+                  <a:schemeClr val="tx1"/>
+                </a:solidFill>
+                <a:latin typeface="+mn-lt"/>
+                <a:ea typeface="+mn-ea"/>
+                <a:cs typeface="+mn-cs"/>
+              </a:defRPr>
+            </a:lvl3pPr>
+            <a:lvl4pPr marL="1600200" indent="-228600" algn="l" defTabSz="914400" rtl="0" eaLnBrk="1" latinLnBrk="0" hangingPunct="1">
+              <a:spcBef>
+                <a:spcPct val="20000"/>
+              </a:spcBef>
+              <a:buClr>
+                <a:schemeClr val="tx2"/>
+              </a:buClr>
+              <a:buFont typeface="Arial" pitchFamily="34" charset="0"/>
+              <a:buChar char="•"/>
+              <a:defRPr sz="1800" kern="1200">
+                <a:solidFill>
+                  <a:schemeClr val="tx1"/>
+                </a:solidFill>
+                <a:latin typeface="+mn-lt"/>
+                <a:ea typeface="+mn-ea"/>
+                <a:cs typeface="+mn-cs"/>
+              </a:defRPr>
+            </a:lvl4pPr>
+            <a:lvl5pPr marL="2057400" indent="-228600" algn="l" defTabSz="914400" rtl="0" eaLnBrk="1" latinLnBrk="0" hangingPunct="1">
+              <a:spcBef>
+                <a:spcPct val="20000"/>
+              </a:spcBef>
+              <a:buClr>
+                <a:schemeClr val="tx2"/>
+              </a:buClr>
+              <a:buFont typeface="Arial" pitchFamily="34" charset="0"/>
+              <a:buChar char="•"/>
+              <a:defRPr sz="1800" kern="1200" baseline="0">
+                <a:solidFill>
+                  <a:schemeClr val="tx1"/>
+                </a:solidFill>
+                <a:latin typeface="+mn-lt"/>
+                <a:ea typeface="+mn-ea"/>
+                <a:cs typeface="+mn-cs"/>
+              </a:defRPr>
+            </a:lvl5pPr>
+            <a:lvl6pPr marL="2514600" indent="-228600" algn="l" defTabSz="914400" rtl="0" eaLnBrk="1" latinLnBrk="0" hangingPunct="1">
+              <a:spcBef>
+                <a:spcPct val="20000"/>
+              </a:spcBef>
+              <a:buClr>
+                <a:schemeClr val="tx2"/>
+              </a:buClr>
+              <a:buFont typeface="Arial" pitchFamily="34" charset="0"/>
+              <a:buChar char="•"/>
+              <a:defRPr sz="1600" kern="1200">
+                <a:solidFill>
+                  <a:schemeClr val="tx1"/>
+                </a:solidFill>
+                <a:latin typeface="+mn-lt"/>
+                <a:ea typeface="+mn-ea"/>
+                <a:cs typeface="+mn-cs"/>
+              </a:defRPr>
+            </a:lvl6pPr>
+            <a:lvl7pPr marL="2971800" indent="-228600" algn="l" defTabSz="914400" rtl="0" eaLnBrk="1" latinLnBrk="0" hangingPunct="1">
+              <a:spcBef>
+                <a:spcPct val="20000"/>
+              </a:spcBef>
+              <a:buClr>
+                <a:schemeClr val="tx2"/>
+              </a:buClr>
+              <a:buFont typeface="Arial" pitchFamily="34" charset="0"/>
+              <a:buChar char="•"/>
+              <a:defRPr sz="1600" kern="1200">
+                <a:solidFill>
+                  <a:schemeClr val="tx1"/>
+                </a:solidFill>
+                <a:latin typeface="+mn-lt"/>
+                <a:ea typeface="+mn-ea"/>
+                <a:cs typeface="+mn-cs"/>
+              </a:defRPr>
+            </a:lvl7pPr>
+            <a:lvl8pPr marL="3429000" indent="-228600" algn="l" defTabSz="914400" rtl="0" eaLnBrk="1" latinLnBrk="0" hangingPunct="1">
+              <a:spcBef>
+                <a:spcPct val="20000"/>
+              </a:spcBef>
+              <a:buClr>
+                <a:schemeClr val="tx2"/>
+              </a:buClr>
+              <a:buFont typeface="Arial" pitchFamily="34" charset="0"/>
+              <a:buChar char="•"/>
+              <a:defRPr sz="1600" kern="1200">
+                <a:solidFill>
+                  <a:schemeClr val="tx1"/>
+                </a:solidFill>
+                <a:latin typeface="+mn-lt"/>
+                <a:ea typeface="+mn-ea"/>
+                <a:cs typeface="+mn-cs"/>
+              </a:defRPr>
+            </a:lvl8pPr>
+            <a:lvl9pPr marL="3886200" indent="-228600" algn="l" defTabSz="914400" rtl="0" eaLnBrk="1" latinLnBrk="0" hangingPunct="1">
+              <a:spcBef>
+                <a:spcPct val="20000"/>
+              </a:spcBef>
+              <a:buClr>
+                <a:schemeClr val="tx2"/>
+              </a:buClr>
+              <a:buFont typeface="Arial" pitchFamily="34" charset="0"/>
+              <a:buChar char="•"/>
+              <a:defRPr sz="1600" kern="1200">
+                <a:solidFill>
+                  <a:schemeClr val="tx1"/>
+                </a:solidFill>
+                <a:latin typeface="+mn-lt"/>
+                <a:ea typeface="+mn-ea"/>
+                <a:cs typeface="+mn-cs"/>
+              </a:defRPr>
+            </a:lvl9pPr>
+          </a:lstStyle>
+          <a:p>
+            <a:pPr marL="285750" indent="-285750">
+              <a:buFont typeface="Arial"/>
+              <a:buChar char="•"/>
+            </a:pPr>
+            <a:r>
+              <a:rPr lang="en-US" b="0" dirty="0" smtClean="0">
+                <a:latin typeface="Calibri" charset="0"/>
+                <a:ea typeface="Calibri" charset="0"/>
+                <a:cs typeface="Calibri" charset="0"/>
+              </a:rPr>
+              <a:t>In the smartphone: open the </a:t>
+            </a:r>
+            <a:r>
+              <a:rPr lang="en-US" b="0" dirty="0" err="1" smtClean="0">
+                <a:solidFill>
+                  <a:srgbClr val="D1282E"/>
+                </a:solidFill>
+                <a:latin typeface="Calibri" charset="0"/>
+                <a:ea typeface="Calibri" charset="0"/>
+                <a:cs typeface="Calibri" charset="0"/>
+              </a:rPr>
+              <a:t>MIROapp</a:t>
+            </a:r>
+            <a:r>
+              <a:rPr lang="en-US" b="0" dirty="0" smtClean="0">
+                <a:solidFill>
+                  <a:srgbClr val="D1282E"/>
+                </a:solidFill>
+                <a:latin typeface="Calibri" charset="0"/>
+                <a:ea typeface="Calibri" charset="0"/>
+                <a:cs typeface="Calibri" charset="0"/>
+              </a:rPr>
+              <a:t> </a:t>
+            </a:r>
+            <a:r>
+              <a:rPr lang="en-US" b="0" dirty="0" smtClean="0">
+                <a:latin typeface="Calibri" charset="0"/>
+                <a:ea typeface="Calibri" charset="0"/>
+                <a:cs typeface="Calibri" charset="0"/>
+              </a:rPr>
+              <a:t>and check its </a:t>
+            </a:r>
+            <a:r>
+              <a:rPr lang="en-US" b="0" dirty="0" smtClean="0">
+                <a:solidFill>
+                  <a:srgbClr val="D1282E"/>
+                </a:solidFill>
+                <a:latin typeface="Calibri" charset="0"/>
+                <a:ea typeface="Calibri" charset="0"/>
+                <a:cs typeface="Calibri" charset="0"/>
+              </a:rPr>
+              <a:t>IP address</a:t>
+            </a:r>
+          </a:p>
+        </p:txBody>
+      </p:sp>
+      <p:sp>
+        <p:nvSpPr>
+          <p:cNvPr id="9" name="Content Placeholder 3"/>
+          <p:cNvSpPr txBox="1">
+            <a:spLocks/>
+          </p:cNvSpPr>
+          <p:nvPr/>
+        </p:nvSpPr>
+        <p:spPr>
+          <a:xfrm>
+            <a:off x="457193" y="3083924"/>
+            <a:ext cx="7620000" cy="577826"/>
+          </a:xfrm>
+          <a:prstGeom prst="rect">
+            <a:avLst/>
+          </a:prstGeom>
+        </p:spPr>
+        <p:txBody>
+          <a:bodyPr vert="horz" lIns="91440" tIns="45720" rIns="91440" bIns="45720" rtlCol="0">
+            <a:normAutofit/>
+          </a:bodyPr>
+          <a:lstStyle>
+            <a:lvl1pPr marL="0" indent="0" algn="l" defTabSz="914400" rtl="0" eaLnBrk="1" latinLnBrk="0" hangingPunct="1">
+              <a:spcBef>
+                <a:spcPct val="20000"/>
+              </a:spcBef>
+              <a:spcAft>
+                <a:spcPts val="600"/>
+              </a:spcAft>
+              <a:buFont typeface="Arial" pitchFamily="34" charset="0"/>
+              <a:buNone/>
+              <a:defRPr sz="2000" b="1" kern="1200">
+                <a:solidFill>
+                  <a:schemeClr val="tx1"/>
+                </a:solidFill>
+                <a:latin typeface="+mn-lt"/>
+                <a:ea typeface="+mn-ea"/>
+                <a:cs typeface="+mn-cs"/>
+              </a:defRPr>
+            </a:lvl1pPr>
+            <a:lvl2pPr marL="457200" indent="-182880" algn="l" defTabSz="914400" rtl="0" eaLnBrk="1" latinLnBrk="0" hangingPunct="1">
+              <a:spcBef>
+                <a:spcPct val="20000"/>
+              </a:spcBef>
+              <a:buClr>
+                <a:schemeClr val="tx2"/>
+              </a:buClr>
+              <a:buFont typeface="Arial" pitchFamily="34" charset="0"/>
+              <a:buChar char="•"/>
+              <a:defRPr sz="2000" kern="1200">
+                <a:solidFill>
+                  <a:schemeClr val="tx1"/>
+                </a:solidFill>
+                <a:latin typeface="+mn-lt"/>
+                <a:ea typeface="+mn-ea"/>
+                <a:cs typeface="+mn-cs"/>
+              </a:defRPr>
+            </a:lvl2pPr>
+            <a:lvl3pPr marL="1143000" indent="-228600" algn="l" defTabSz="914400" rtl="0" eaLnBrk="1" latinLnBrk="0" hangingPunct="1">
+              <a:spcBef>
+                <a:spcPct val="20000"/>
+              </a:spcBef>
+              <a:buClr>
+                <a:schemeClr val="tx2"/>
+              </a:buClr>
+              <a:buFont typeface="Arial" pitchFamily="34" charset="0"/>
+              <a:buChar char="•"/>
+              <a:defRPr sz="1800" kern="1200">
+                <a:solidFill>
+                  <a:schemeClr val="tx1"/>
+                </a:solidFill>
+                <a:latin typeface="+mn-lt"/>
+                <a:ea typeface="+mn-ea"/>
+                <a:cs typeface="+mn-cs"/>
+              </a:defRPr>
+            </a:lvl3pPr>
+            <a:lvl4pPr marL="1600200" indent="-228600" algn="l" defTabSz="914400" rtl="0" eaLnBrk="1" latinLnBrk="0" hangingPunct="1">
+              <a:spcBef>
+                <a:spcPct val="20000"/>
+              </a:spcBef>
+              <a:buClr>
+                <a:schemeClr val="tx2"/>
+              </a:buClr>
+              <a:buFont typeface="Arial" pitchFamily="34" charset="0"/>
+              <a:buChar char="•"/>
+              <a:defRPr sz="1800" kern="1200">
+                <a:solidFill>
+                  <a:schemeClr val="tx1"/>
+                </a:solidFill>
+                <a:latin typeface="+mn-lt"/>
+                <a:ea typeface="+mn-ea"/>
+                <a:cs typeface="+mn-cs"/>
+              </a:defRPr>
+            </a:lvl4pPr>
+            <a:lvl5pPr marL="2057400" indent="-228600" algn="l" defTabSz="914400" rtl="0" eaLnBrk="1" latinLnBrk="0" hangingPunct="1">
+              <a:spcBef>
+                <a:spcPct val="20000"/>
+              </a:spcBef>
+              <a:buClr>
+                <a:schemeClr val="tx2"/>
+              </a:buClr>
+              <a:buFont typeface="Arial" pitchFamily="34" charset="0"/>
+              <a:buChar char="•"/>
+              <a:defRPr sz="1800" kern="1200" baseline="0">
+                <a:solidFill>
+                  <a:schemeClr val="tx1"/>
+                </a:solidFill>
+                <a:latin typeface="+mn-lt"/>
+                <a:ea typeface="+mn-ea"/>
+                <a:cs typeface="+mn-cs"/>
+              </a:defRPr>
+            </a:lvl5pPr>
+            <a:lvl6pPr marL="2514600" indent="-228600" algn="l" defTabSz="914400" rtl="0" eaLnBrk="1" latinLnBrk="0" hangingPunct="1">
+              <a:spcBef>
+                <a:spcPct val="20000"/>
+              </a:spcBef>
+              <a:buClr>
+                <a:schemeClr val="tx2"/>
+              </a:buClr>
+              <a:buFont typeface="Arial" pitchFamily="34" charset="0"/>
+              <a:buChar char="•"/>
+              <a:defRPr sz="1600" kern="1200">
+                <a:solidFill>
+                  <a:schemeClr val="tx1"/>
+                </a:solidFill>
+                <a:latin typeface="+mn-lt"/>
+                <a:ea typeface="+mn-ea"/>
+                <a:cs typeface="+mn-cs"/>
+              </a:defRPr>
+            </a:lvl6pPr>
+            <a:lvl7pPr marL="2971800" indent="-228600" algn="l" defTabSz="914400" rtl="0" eaLnBrk="1" latinLnBrk="0" hangingPunct="1">
+              <a:spcBef>
+                <a:spcPct val="20000"/>
+              </a:spcBef>
+              <a:buClr>
+                <a:schemeClr val="tx2"/>
+              </a:buClr>
+              <a:buFont typeface="Arial" pitchFamily="34" charset="0"/>
+              <a:buChar char="•"/>
+              <a:defRPr sz="1600" kern="1200">
+                <a:solidFill>
+                  <a:schemeClr val="tx1"/>
+                </a:solidFill>
+                <a:latin typeface="+mn-lt"/>
+                <a:ea typeface="+mn-ea"/>
+                <a:cs typeface="+mn-cs"/>
+              </a:defRPr>
+            </a:lvl7pPr>
+            <a:lvl8pPr marL="3429000" indent="-228600" algn="l" defTabSz="914400" rtl="0" eaLnBrk="1" latinLnBrk="0" hangingPunct="1">
+              <a:spcBef>
+                <a:spcPct val="20000"/>
+              </a:spcBef>
+              <a:buClr>
+                <a:schemeClr val="tx2"/>
+              </a:buClr>
+              <a:buFont typeface="Arial" pitchFamily="34" charset="0"/>
+              <a:buChar char="•"/>
+              <a:defRPr sz="1600" kern="1200">
+                <a:solidFill>
+                  <a:schemeClr val="tx1"/>
+                </a:solidFill>
+                <a:latin typeface="+mn-lt"/>
+                <a:ea typeface="+mn-ea"/>
+                <a:cs typeface="+mn-cs"/>
+              </a:defRPr>
+            </a:lvl8pPr>
+            <a:lvl9pPr marL="3886200" indent="-228600" algn="l" defTabSz="914400" rtl="0" eaLnBrk="1" latinLnBrk="0" hangingPunct="1">
+              <a:spcBef>
+                <a:spcPct val="20000"/>
+              </a:spcBef>
+              <a:buClr>
+                <a:schemeClr val="tx2"/>
+              </a:buClr>
+              <a:buFont typeface="Arial" pitchFamily="34" charset="0"/>
+              <a:buChar char="•"/>
+              <a:defRPr sz="1600" kern="1200">
+                <a:solidFill>
+                  <a:schemeClr val="tx1"/>
+                </a:solidFill>
+                <a:latin typeface="+mn-lt"/>
+                <a:ea typeface="+mn-ea"/>
+                <a:cs typeface="+mn-cs"/>
+              </a:defRPr>
+            </a:lvl9pPr>
+          </a:lstStyle>
+          <a:p>
+            <a:pPr marL="285750" indent="-285750">
+              <a:buFont typeface="Arial"/>
+              <a:buChar char="•"/>
+            </a:pPr>
+            <a:r>
+              <a:rPr lang="en-US" b="0" dirty="0" smtClean="0">
+                <a:latin typeface="Calibri" charset="0"/>
+                <a:ea typeface="Calibri" charset="0"/>
+                <a:cs typeface="Calibri" charset="0"/>
+              </a:rPr>
+              <a:t>MIRO’s SSH entry password is:</a:t>
+            </a:r>
+          </a:p>
+        </p:txBody>
+      </p:sp>
+      <p:sp>
+        <p:nvSpPr>
+          <p:cNvPr id="11" name="TextBox 10"/>
+          <p:cNvSpPr txBox="1"/>
+          <p:nvPr/>
+        </p:nvSpPr>
+        <p:spPr>
+          <a:xfrm>
+            <a:off x="771627" y="3382838"/>
+            <a:ext cx="4976042" cy="338554"/>
+          </a:xfrm>
+          <a:prstGeom prst="rect">
+            <a:avLst/>
+          </a:prstGeom>
+          <a:noFill/>
+        </p:spPr>
+        <p:txBody>
+          <a:bodyPr wrap="square" rtlCol="0">
+            <a:spAutoFit/>
+          </a:bodyPr>
+          <a:lstStyle/>
+          <a:p>
+            <a:r>
+              <a:rPr lang="en-US" sz="1600" dirty="0" smtClean="0">
+                <a:latin typeface="Apple Symbols" charset="0"/>
+                <a:ea typeface="Apple Symbols" charset="0"/>
+                <a:cs typeface="Apple Symbols" charset="0"/>
+              </a:rPr>
+              <a:t>$ MIROOpen1</a:t>
+            </a:r>
+          </a:p>
+        </p:txBody>
+      </p:sp>
+      <p:sp>
+        <p:nvSpPr>
+          <p:cNvPr id="12" name="Content Placeholder 3"/>
+          <p:cNvSpPr txBox="1">
+            <a:spLocks/>
+          </p:cNvSpPr>
+          <p:nvPr/>
+        </p:nvSpPr>
+        <p:spPr>
+          <a:xfrm>
+            <a:off x="457193" y="3688257"/>
+            <a:ext cx="7620000" cy="352908"/>
+          </a:xfrm>
+          <a:prstGeom prst="rect">
+            <a:avLst/>
+          </a:prstGeom>
+        </p:spPr>
+        <p:txBody>
+          <a:bodyPr vert="horz" lIns="91440" tIns="45720" rIns="91440" bIns="45720" rtlCol="0">
+            <a:noAutofit/>
+          </a:bodyPr>
+          <a:lstStyle>
+            <a:lvl1pPr marL="0" indent="0" algn="l" defTabSz="914400" rtl="0" eaLnBrk="1" latinLnBrk="0" hangingPunct="1">
+              <a:spcBef>
+                <a:spcPct val="20000"/>
+              </a:spcBef>
+              <a:spcAft>
+                <a:spcPts val="600"/>
+              </a:spcAft>
+              <a:buFont typeface="Arial" pitchFamily="34" charset="0"/>
+              <a:buNone/>
+              <a:defRPr sz="2000" b="1" kern="1200">
+                <a:solidFill>
+                  <a:schemeClr val="tx1"/>
+                </a:solidFill>
+                <a:latin typeface="+mn-lt"/>
+                <a:ea typeface="+mn-ea"/>
+                <a:cs typeface="+mn-cs"/>
+              </a:defRPr>
+            </a:lvl1pPr>
+            <a:lvl2pPr marL="457200" indent="-182880" algn="l" defTabSz="914400" rtl="0" eaLnBrk="1" latinLnBrk="0" hangingPunct="1">
+              <a:spcBef>
+                <a:spcPct val="20000"/>
+              </a:spcBef>
+              <a:buClr>
+                <a:schemeClr val="tx2"/>
+              </a:buClr>
+              <a:buFont typeface="Arial" pitchFamily="34" charset="0"/>
+              <a:buChar char="•"/>
+              <a:defRPr sz="2000" kern="1200">
+                <a:solidFill>
+                  <a:schemeClr val="tx1"/>
+                </a:solidFill>
+                <a:latin typeface="+mn-lt"/>
+                <a:ea typeface="+mn-ea"/>
+                <a:cs typeface="+mn-cs"/>
+              </a:defRPr>
+            </a:lvl2pPr>
+            <a:lvl3pPr marL="1143000" indent="-228600" algn="l" defTabSz="914400" rtl="0" eaLnBrk="1" latinLnBrk="0" hangingPunct="1">
+              <a:spcBef>
+                <a:spcPct val="20000"/>
+              </a:spcBef>
+              <a:buClr>
+                <a:schemeClr val="tx2"/>
+              </a:buClr>
+              <a:buFont typeface="Arial" pitchFamily="34" charset="0"/>
+              <a:buChar char="•"/>
+              <a:defRPr sz="1800" kern="1200">
+                <a:solidFill>
+                  <a:schemeClr val="tx1"/>
+                </a:solidFill>
+                <a:latin typeface="+mn-lt"/>
+                <a:ea typeface="+mn-ea"/>
+                <a:cs typeface="+mn-cs"/>
+              </a:defRPr>
+            </a:lvl3pPr>
+            <a:lvl4pPr marL="1600200" indent="-228600" algn="l" defTabSz="914400" rtl="0" eaLnBrk="1" latinLnBrk="0" hangingPunct="1">
+              <a:spcBef>
+                <a:spcPct val="20000"/>
+              </a:spcBef>
+              <a:buClr>
+                <a:schemeClr val="tx2"/>
+              </a:buClr>
+              <a:buFont typeface="Arial" pitchFamily="34" charset="0"/>
+              <a:buChar char="•"/>
+              <a:defRPr sz="1800" kern="1200">
+                <a:solidFill>
+                  <a:schemeClr val="tx1"/>
+                </a:solidFill>
+                <a:latin typeface="+mn-lt"/>
+                <a:ea typeface="+mn-ea"/>
+                <a:cs typeface="+mn-cs"/>
+              </a:defRPr>
+            </a:lvl4pPr>
+            <a:lvl5pPr marL="2057400" indent="-228600" algn="l" defTabSz="914400" rtl="0" eaLnBrk="1" latinLnBrk="0" hangingPunct="1">
+              <a:spcBef>
+                <a:spcPct val="20000"/>
+              </a:spcBef>
+              <a:buClr>
+                <a:schemeClr val="tx2"/>
+              </a:buClr>
+              <a:buFont typeface="Arial" pitchFamily="34" charset="0"/>
+              <a:buChar char="•"/>
+              <a:defRPr sz="1800" kern="1200" baseline="0">
+                <a:solidFill>
+                  <a:schemeClr val="tx1"/>
+                </a:solidFill>
+                <a:latin typeface="+mn-lt"/>
+                <a:ea typeface="+mn-ea"/>
+                <a:cs typeface="+mn-cs"/>
+              </a:defRPr>
+            </a:lvl5pPr>
+            <a:lvl6pPr marL="2514600" indent="-228600" algn="l" defTabSz="914400" rtl="0" eaLnBrk="1" latinLnBrk="0" hangingPunct="1">
+              <a:spcBef>
+                <a:spcPct val="20000"/>
+              </a:spcBef>
+              <a:buClr>
+                <a:schemeClr val="tx2"/>
+              </a:buClr>
+              <a:buFont typeface="Arial" pitchFamily="34" charset="0"/>
+              <a:buChar char="•"/>
+              <a:defRPr sz="1600" kern="1200">
+                <a:solidFill>
+                  <a:schemeClr val="tx1"/>
+                </a:solidFill>
+                <a:latin typeface="+mn-lt"/>
+                <a:ea typeface="+mn-ea"/>
+                <a:cs typeface="+mn-cs"/>
+              </a:defRPr>
+            </a:lvl6pPr>
+            <a:lvl7pPr marL="2971800" indent="-228600" algn="l" defTabSz="914400" rtl="0" eaLnBrk="1" latinLnBrk="0" hangingPunct="1">
+              <a:spcBef>
+                <a:spcPct val="20000"/>
+              </a:spcBef>
+              <a:buClr>
+                <a:schemeClr val="tx2"/>
+              </a:buClr>
+              <a:buFont typeface="Arial" pitchFamily="34" charset="0"/>
+              <a:buChar char="•"/>
+              <a:defRPr sz="1600" kern="1200">
+                <a:solidFill>
+                  <a:schemeClr val="tx1"/>
+                </a:solidFill>
+                <a:latin typeface="+mn-lt"/>
+                <a:ea typeface="+mn-ea"/>
+                <a:cs typeface="+mn-cs"/>
+              </a:defRPr>
+            </a:lvl7pPr>
+            <a:lvl8pPr marL="3429000" indent="-228600" algn="l" defTabSz="914400" rtl="0" eaLnBrk="1" latinLnBrk="0" hangingPunct="1">
+              <a:spcBef>
+                <a:spcPct val="20000"/>
+              </a:spcBef>
+              <a:buClr>
+                <a:schemeClr val="tx2"/>
+              </a:buClr>
+              <a:buFont typeface="Arial" pitchFamily="34" charset="0"/>
+              <a:buChar char="•"/>
+              <a:defRPr sz="1600" kern="1200">
+                <a:solidFill>
+                  <a:schemeClr val="tx1"/>
+                </a:solidFill>
+                <a:latin typeface="+mn-lt"/>
+                <a:ea typeface="+mn-ea"/>
+                <a:cs typeface="+mn-cs"/>
+              </a:defRPr>
+            </a:lvl8pPr>
+            <a:lvl9pPr marL="3886200" indent="-228600" algn="l" defTabSz="914400" rtl="0" eaLnBrk="1" latinLnBrk="0" hangingPunct="1">
+              <a:spcBef>
+                <a:spcPct val="20000"/>
+              </a:spcBef>
+              <a:buClr>
+                <a:schemeClr val="tx2"/>
+              </a:buClr>
+              <a:buFont typeface="Arial" pitchFamily="34" charset="0"/>
+              <a:buChar char="•"/>
+              <a:defRPr sz="1600" kern="1200">
+                <a:solidFill>
+                  <a:schemeClr val="tx1"/>
+                </a:solidFill>
+                <a:latin typeface="+mn-lt"/>
+                <a:ea typeface="+mn-ea"/>
+                <a:cs typeface="+mn-cs"/>
+              </a:defRPr>
+            </a:lvl9pPr>
+          </a:lstStyle>
+          <a:p>
+            <a:pPr marL="285750" indent="-285750">
+              <a:buFont typeface="Arial"/>
+              <a:buChar char="•"/>
+            </a:pPr>
+            <a:r>
+              <a:rPr lang="en-US" b="0" dirty="0" smtClean="0">
+                <a:latin typeface="Calibri" charset="0"/>
+                <a:ea typeface="Calibri" charset="0"/>
+                <a:cs typeface="Calibri" charset="0"/>
+              </a:rPr>
+              <a:t>Once inside MIRO’s Terminal, type in:</a:t>
+            </a:r>
+          </a:p>
+        </p:txBody>
+      </p:sp>
+      <p:sp>
+        <p:nvSpPr>
+          <p:cNvPr id="13" name="TextBox 12"/>
+          <p:cNvSpPr txBox="1"/>
+          <p:nvPr/>
+        </p:nvSpPr>
+        <p:spPr>
+          <a:xfrm>
+            <a:off x="760436" y="3992156"/>
+            <a:ext cx="4987232" cy="338554"/>
+          </a:xfrm>
+          <a:prstGeom prst="rect">
+            <a:avLst/>
+          </a:prstGeom>
+          <a:noFill/>
+        </p:spPr>
+        <p:txBody>
+          <a:bodyPr wrap="square" rtlCol="0">
+            <a:spAutoFit/>
+          </a:bodyPr>
+          <a:lstStyle/>
+          <a:p>
+            <a:r>
+              <a:rPr lang="en-US" sz="1600" dirty="0" smtClean="0">
+                <a:latin typeface="Apple Symbols" charset="0"/>
+                <a:ea typeface="Apple Symbols" charset="0"/>
+                <a:cs typeface="Apple Symbols" charset="0"/>
+              </a:rPr>
+              <a:t>$ </a:t>
+            </a:r>
+            <a:r>
+              <a:rPr lang="pt-BR" sz="1600" dirty="0" err="1">
+                <a:latin typeface="Apple Symbols" charset="0"/>
+                <a:ea typeface="Apple Symbols" charset="0"/>
+                <a:cs typeface="Apple Symbols" charset="0"/>
+              </a:rPr>
+              <a:t>sudo</a:t>
+            </a:r>
+            <a:r>
+              <a:rPr lang="pt-BR" sz="1600" dirty="0">
+                <a:latin typeface="Apple Symbols" charset="0"/>
+                <a:ea typeface="Apple Symbols" charset="0"/>
+                <a:cs typeface="Apple Symbols" charset="0"/>
+              </a:rPr>
+              <a:t> nano ~/.profile </a:t>
+            </a:r>
+            <a:endParaRPr lang="en-US" sz="1600" dirty="0" smtClean="0">
+              <a:latin typeface="Apple Symbols" charset="0"/>
+              <a:ea typeface="Apple Symbols" charset="0"/>
+              <a:cs typeface="Apple Symbols" charset="0"/>
+            </a:endParaRPr>
+          </a:p>
+        </p:txBody>
+      </p:sp>
+      <p:sp>
+        <p:nvSpPr>
+          <p:cNvPr id="3" name="TextBox 2"/>
+          <p:cNvSpPr txBox="1"/>
+          <p:nvPr/>
+        </p:nvSpPr>
+        <p:spPr>
+          <a:xfrm>
+            <a:off x="457193" y="5394172"/>
+            <a:ext cx="184731" cy="400110"/>
+          </a:xfrm>
+          <a:prstGeom prst="rect">
+            <a:avLst/>
+          </a:prstGeom>
+          <a:noFill/>
+        </p:spPr>
+        <p:txBody>
+          <a:bodyPr wrap="none" rtlCol="0">
+            <a:spAutoFit/>
+          </a:bodyPr>
+          <a:lstStyle/>
+          <a:p>
+            <a:endParaRPr lang="en-US" sz="2000" dirty="0">
+              <a:latin typeface="Calibri" charset="0"/>
+              <a:ea typeface="Calibri" charset="0"/>
+              <a:cs typeface="Calibri" charset="0"/>
+            </a:endParaRPr>
+          </a:p>
+        </p:txBody>
+      </p:sp>
+      <p:sp>
+        <p:nvSpPr>
+          <p:cNvPr id="18" name="TextBox 17"/>
+          <p:cNvSpPr txBox="1"/>
+          <p:nvPr/>
+        </p:nvSpPr>
+        <p:spPr>
+          <a:xfrm>
+            <a:off x="457200" y="712382"/>
+            <a:ext cx="8006316" cy="769441"/>
+          </a:xfrm>
+          <a:prstGeom prst="rect">
+            <a:avLst/>
+          </a:prstGeom>
+          <a:noFill/>
+        </p:spPr>
+        <p:txBody>
+          <a:bodyPr wrap="square" rtlCol="0">
+            <a:spAutoFit/>
+          </a:bodyPr>
+          <a:lstStyle/>
+          <a:p>
+            <a:r>
+              <a:rPr lang="en-GB" sz="4400" dirty="0" smtClean="0">
+                <a:solidFill>
+                  <a:srgbClr val="C00000"/>
+                </a:solidFill>
+                <a:latin typeface="Calibri Light" charset="0"/>
+                <a:ea typeface="Calibri Light" charset="0"/>
+                <a:cs typeface="Calibri Light" charset="0"/>
+              </a:rPr>
+              <a:t>C</a:t>
+            </a:r>
+            <a:r>
+              <a:rPr lang="en-GB" sz="4400" dirty="0" smtClean="0">
+                <a:latin typeface="Calibri Light" charset="0"/>
+                <a:ea typeface="Calibri Light" charset="0"/>
+                <a:cs typeface="Calibri Light" charset="0"/>
+              </a:rPr>
+              <a:t>onfiguring </a:t>
+            </a:r>
+            <a:r>
+              <a:rPr lang="en-GB" sz="4400" dirty="0" smtClean="0">
+                <a:solidFill>
+                  <a:srgbClr val="C00000"/>
+                </a:solidFill>
+                <a:latin typeface="Calibri Light" charset="0"/>
+                <a:ea typeface="Calibri Light" charset="0"/>
+                <a:cs typeface="Calibri Light" charset="0"/>
+              </a:rPr>
+              <a:t>MiRo</a:t>
+            </a:r>
+            <a:endParaRPr lang="en-GB" sz="4400" dirty="0">
+              <a:latin typeface="Calibri Light" charset="0"/>
+              <a:ea typeface="Calibri Light" charset="0"/>
+              <a:cs typeface="Calibri Light" charset="0"/>
+            </a:endParaRPr>
+          </a:p>
+        </p:txBody>
+      </p:sp>
+      <p:sp>
+        <p:nvSpPr>
+          <p:cNvPr id="19" name="Content Placeholder 3"/>
+          <p:cNvSpPr txBox="1">
+            <a:spLocks/>
+          </p:cNvSpPr>
+          <p:nvPr/>
+        </p:nvSpPr>
+        <p:spPr>
+          <a:xfrm>
+            <a:off x="457191" y="4371992"/>
+            <a:ext cx="7620000" cy="1837421"/>
+          </a:xfrm>
+          <a:prstGeom prst="rect">
+            <a:avLst/>
+          </a:prstGeom>
+        </p:spPr>
+        <p:txBody>
+          <a:bodyPr vert="horz" lIns="91440" tIns="45720" rIns="91440" bIns="45720" rtlCol="0">
+            <a:noAutofit/>
+          </a:bodyPr>
+          <a:lstStyle>
+            <a:lvl1pPr marL="0" indent="0" algn="l" defTabSz="914400" rtl="0" eaLnBrk="1" latinLnBrk="0" hangingPunct="1">
+              <a:spcBef>
+                <a:spcPct val="20000"/>
+              </a:spcBef>
+              <a:spcAft>
+                <a:spcPts val="600"/>
+              </a:spcAft>
+              <a:buFont typeface="Arial" pitchFamily="34" charset="0"/>
+              <a:buNone/>
+              <a:defRPr sz="2000" b="1" kern="1200">
+                <a:solidFill>
+                  <a:schemeClr val="tx1"/>
+                </a:solidFill>
+                <a:latin typeface="+mn-lt"/>
+                <a:ea typeface="+mn-ea"/>
+                <a:cs typeface="+mn-cs"/>
+              </a:defRPr>
+            </a:lvl1pPr>
+            <a:lvl2pPr marL="457200" indent="-182880" algn="l" defTabSz="914400" rtl="0" eaLnBrk="1" latinLnBrk="0" hangingPunct="1">
+              <a:spcBef>
+                <a:spcPct val="20000"/>
+              </a:spcBef>
+              <a:buClr>
+                <a:schemeClr val="tx2"/>
+              </a:buClr>
+              <a:buFont typeface="Arial" pitchFamily="34" charset="0"/>
+              <a:buChar char="•"/>
+              <a:defRPr sz="2000" kern="1200">
+                <a:solidFill>
+                  <a:schemeClr val="tx1"/>
+                </a:solidFill>
+                <a:latin typeface="+mn-lt"/>
+                <a:ea typeface="+mn-ea"/>
+                <a:cs typeface="+mn-cs"/>
+              </a:defRPr>
+            </a:lvl2pPr>
+            <a:lvl3pPr marL="1143000" indent="-228600" algn="l" defTabSz="914400" rtl="0" eaLnBrk="1" latinLnBrk="0" hangingPunct="1">
+              <a:spcBef>
+                <a:spcPct val="20000"/>
+              </a:spcBef>
+              <a:buClr>
+                <a:schemeClr val="tx2"/>
+              </a:buClr>
+              <a:buFont typeface="Arial" pitchFamily="34" charset="0"/>
+              <a:buChar char="•"/>
+              <a:defRPr sz="1800" kern="1200">
+                <a:solidFill>
+                  <a:schemeClr val="tx1"/>
+                </a:solidFill>
+                <a:latin typeface="+mn-lt"/>
+                <a:ea typeface="+mn-ea"/>
+                <a:cs typeface="+mn-cs"/>
+              </a:defRPr>
+            </a:lvl3pPr>
+            <a:lvl4pPr marL="1600200" indent="-228600" algn="l" defTabSz="914400" rtl="0" eaLnBrk="1" latinLnBrk="0" hangingPunct="1">
+              <a:spcBef>
+                <a:spcPct val="20000"/>
+              </a:spcBef>
+              <a:buClr>
+                <a:schemeClr val="tx2"/>
+              </a:buClr>
+              <a:buFont typeface="Arial" pitchFamily="34" charset="0"/>
+              <a:buChar char="•"/>
+              <a:defRPr sz="1800" kern="1200">
+                <a:solidFill>
+                  <a:schemeClr val="tx1"/>
+                </a:solidFill>
+                <a:latin typeface="+mn-lt"/>
+                <a:ea typeface="+mn-ea"/>
+                <a:cs typeface="+mn-cs"/>
+              </a:defRPr>
+            </a:lvl4pPr>
+            <a:lvl5pPr marL="2057400" indent="-228600" algn="l" defTabSz="914400" rtl="0" eaLnBrk="1" latinLnBrk="0" hangingPunct="1">
+              <a:spcBef>
+                <a:spcPct val="20000"/>
+              </a:spcBef>
+              <a:buClr>
+                <a:schemeClr val="tx2"/>
+              </a:buClr>
+              <a:buFont typeface="Arial" pitchFamily="34" charset="0"/>
+              <a:buChar char="•"/>
+              <a:defRPr sz="1800" kern="1200" baseline="0">
+                <a:solidFill>
+                  <a:schemeClr val="tx1"/>
+                </a:solidFill>
+                <a:latin typeface="+mn-lt"/>
+                <a:ea typeface="+mn-ea"/>
+                <a:cs typeface="+mn-cs"/>
+              </a:defRPr>
+            </a:lvl5pPr>
+            <a:lvl6pPr marL="2514600" indent="-228600" algn="l" defTabSz="914400" rtl="0" eaLnBrk="1" latinLnBrk="0" hangingPunct="1">
+              <a:spcBef>
+                <a:spcPct val="20000"/>
+              </a:spcBef>
+              <a:buClr>
+                <a:schemeClr val="tx2"/>
+              </a:buClr>
+              <a:buFont typeface="Arial" pitchFamily="34" charset="0"/>
+              <a:buChar char="•"/>
+              <a:defRPr sz="1600" kern="1200">
+                <a:solidFill>
+                  <a:schemeClr val="tx1"/>
+                </a:solidFill>
+                <a:latin typeface="+mn-lt"/>
+                <a:ea typeface="+mn-ea"/>
+                <a:cs typeface="+mn-cs"/>
+              </a:defRPr>
+            </a:lvl6pPr>
+            <a:lvl7pPr marL="2971800" indent="-228600" algn="l" defTabSz="914400" rtl="0" eaLnBrk="1" latinLnBrk="0" hangingPunct="1">
+              <a:spcBef>
+                <a:spcPct val="20000"/>
+              </a:spcBef>
+              <a:buClr>
+                <a:schemeClr val="tx2"/>
+              </a:buClr>
+              <a:buFont typeface="Arial" pitchFamily="34" charset="0"/>
+              <a:buChar char="•"/>
+              <a:defRPr sz="1600" kern="1200">
+                <a:solidFill>
+                  <a:schemeClr val="tx1"/>
+                </a:solidFill>
+                <a:latin typeface="+mn-lt"/>
+                <a:ea typeface="+mn-ea"/>
+                <a:cs typeface="+mn-cs"/>
+              </a:defRPr>
+            </a:lvl7pPr>
+            <a:lvl8pPr marL="3429000" indent="-228600" algn="l" defTabSz="914400" rtl="0" eaLnBrk="1" latinLnBrk="0" hangingPunct="1">
+              <a:spcBef>
+                <a:spcPct val="20000"/>
+              </a:spcBef>
+              <a:buClr>
+                <a:schemeClr val="tx2"/>
+              </a:buClr>
+              <a:buFont typeface="Arial" pitchFamily="34" charset="0"/>
+              <a:buChar char="•"/>
+              <a:defRPr sz="1600" kern="1200">
+                <a:solidFill>
+                  <a:schemeClr val="tx1"/>
+                </a:solidFill>
+                <a:latin typeface="+mn-lt"/>
+                <a:ea typeface="+mn-ea"/>
+                <a:cs typeface="+mn-cs"/>
+              </a:defRPr>
+            </a:lvl8pPr>
+            <a:lvl9pPr marL="3886200" indent="-228600" algn="l" defTabSz="914400" rtl="0" eaLnBrk="1" latinLnBrk="0" hangingPunct="1">
+              <a:spcBef>
+                <a:spcPct val="20000"/>
+              </a:spcBef>
+              <a:buClr>
+                <a:schemeClr val="tx2"/>
+              </a:buClr>
+              <a:buFont typeface="Arial" pitchFamily="34" charset="0"/>
+              <a:buChar char="•"/>
+              <a:defRPr sz="1600" kern="1200">
+                <a:solidFill>
+                  <a:schemeClr val="tx1"/>
+                </a:solidFill>
+                <a:latin typeface="+mn-lt"/>
+                <a:ea typeface="+mn-ea"/>
+                <a:cs typeface="+mn-cs"/>
+              </a:defRPr>
+            </a:lvl9pPr>
+          </a:lstStyle>
+          <a:p>
+            <a:pPr marL="285750" indent="-285750">
+              <a:buFont typeface="Arial"/>
+              <a:buChar char="•"/>
+            </a:pPr>
+            <a:r>
+              <a:rPr lang="en-US" b="0" dirty="0" smtClean="0">
+                <a:latin typeface="Calibri" charset="0"/>
+                <a:ea typeface="Calibri" charset="0"/>
+                <a:cs typeface="Calibri" charset="0"/>
+              </a:rPr>
+              <a:t>Once inside .profile</a:t>
+            </a:r>
+          </a:p>
+          <a:p>
+            <a:pPr marL="742950" lvl="1" indent="-285750">
+              <a:buFont typeface="Arial"/>
+              <a:buChar char="•"/>
+            </a:pPr>
+            <a:r>
+              <a:rPr lang="en-US" dirty="0" smtClean="0">
+                <a:latin typeface="Calibri" charset="0"/>
+                <a:ea typeface="Calibri" charset="0"/>
+                <a:cs typeface="Calibri" charset="0"/>
+              </a:rPr>
+              <a:t>Change ROS_MASTER_IP as the IP address of your workstation. T</a:t>
+            </a:r>
+            <a:r>
+              <a:rPr lang="en-US" b="0" dirty="0" smtClean="0">
+                <a:latin typeface="Calibri" charset="0"/>
+                <a:ea typeface="Calibri" charset="0"/>
+                <a:cs typeface="Calibri" charset="0"/>
+              </a:rPr>
+              <a:t>o check the IP address of your workstation open a new </a:t>
+            </a:r>
+            <a:r>
+              <a:rPr lang="en-US" dirty="0">
+                <a:latin typeface="Calibri" charset="0"/>
+                <a:ea typeface="Calibri" charset="0"/>
+                <a:cs typeface="Calibri" charset="0"/>
+              </a:rPr>
+              <a:t>terminal window and  type </a:t>
+            </a:r>
+            <a:r>
+              <a:rPr lang="en-US" dirty="0" smtClean="0">
+                <a:latin typeface="Calibri" charset="0"/>
+                <a:ea typeface="Calibri" charset="0"/>
+                <a:cs typeface="Calibri" charset="0"/>
+              </a:rPr>
+              <a:t>in:</a:t>
+            </a:r>
+            <a:endParaRPr lang="en-US" b="0" dirty="0" smtClean="0">
+              <a:latin typeface="Calibri" charset="0"/>
+              <a:ea typeface="Calibri" charset="0"/>
+              <a:cs typeface="Calibri" charset="0"/>
+            </a:endParaRPr>
+          </a:p>
+          <a:p>
+            <a:pPr lvl="1" indent="0">
+              <a:buNone/>
+            </a:pPr>
+            <a:r>
+              <a:rPr lang="en-US" sz="1600" dirty="0">
+                <a:latin typeface="Apple Symbols" charset="0"/>
+                <a:ea typeface="Apple Symbols" charset="0"/>
+                <a:cs typeface="Apple Symbols" charset="0"/>
+              </a:rPr>
+              <a:t> </a:t>
+            </a:r>
+            <a:r>
+              <a:rPr lang="en-US" sz="1600" dirty="0" smtClean="0">
+                <a:latin typeface="Apple Symbols" charset="0"/>
+                <a:ea typeface="Apple Symbols" charset="0"/>
+                <a:cs typeface="Apple Symbols" charset="0"/>
+              </a:rPr>
+              <a:t>   $ </a:t>
+            </a:r>
+            <a:r>
+              <a:rPr lang="pt-BR" sz="1600" dirty="0" err="1" smtClean="0">
+                <a:latin typeface="Apple Symbols" charset="0"/>
+                <a:ea typeface="Apple Symbols" charset="0"/>
+                <a:cs typeface="Apple Symbols" charset="0"/>
+              </a:rPr>
+              <a:t>ifconfig</a:t>
+            </a:r>
+            <a:endParaRPr lang="en-US" b="0" dirty="0" smtClean="0">
+              <a:latin typeface="Calibri" charset="0"/>
+              <a:ea typeface="Calibri" charset="0"/>
+              <a:cs typeface="Calibri" charset="0"/>
+            </a:endParaRPr>
+          </a:p>
+        </p:txBody>
+      </p:sp>
+    </p:spTree>
+    <p:extLst>
+      <p:ext uri="{BB962C8B-B14F-4D97-AF65-F5344CB8AC3E}">
+        <p14:creationId xmlns:p14="http://schemas.microsoft.com/office/powerpoint/2010/main" val="3852826494"/>
+      </p:ext>
+    </p:extLst>
+  </p:cSld>
+  <p:clrMapOvr>
+    <a:masterClrMapping/>
+  </p:clrMapOvr>
+</p:sld>
+</file>
+
+<file path=ppt/slides/slide11.xml><?xml version="1.0" encoding="utf-8"?>
 <p:sld xmlns:a="http://schemas.openxmlformats.org/drawingml/2006/main" xmlns:r="http://schemas.openxmlformats.org/officeDocument/2006/relationships" xmlns:p="http://schemas.openxmlformats.org/presentationml/2006/main">
   <p:cSld>
     <p:spTree>
@@ -4114,7 +5515,7 @@
 </p:sld>
 </file>
 
-<file path=ppt/slides/slide11.xml><?xml version="1.0" encoding="utf-8"?>
+<file path=ppt/slides/slide12.xml><?xml version="1.0" encoding="utf-8"?>
 <p:sld xmlns:a="http://schemas.openxmlformats.org/drawingml/2006/main" xmlns:r="http://schemas.openxmlformats.org/officeDocument/2006/relationships" xmlns:p="http://schemas.openxmlformats.org/presentationml/2006/main">
   <p:cSld>
     <p:spTree>
@@ -4326,7 +5727,7 @@
 </p:sld>
 </file>
 
-<file path=ppt/slides/slide12.xml><?xml version="1.0" encoding="utf-8"?>
+<file path=ppt/slides/slide13.xml><?xml version="1.0" encoding="utf-8"?>
 <p:sld xmlns:a="http://schemas.openxmlformats.org/drawingml/2006/main" xmlns:r="http://schemas.openxmlformats.org/officeDocument/2006/relationships" xmlns:p="http://schemas.openxmlformats.org/presentationml/2006/main" show="0">
   <p:cSld>
     <p:spTree>
@@ -4774,7 +6175,7 @@
 </p:sld>
 </file>
 
-<file path=ppt/slides/slide13.xml><?xml version="1.0" encoding="utf-8"?>
+<file path=ppt/slides/slide14.xml><?xml version="1.0" encoding="utf-8"?>
 <p:sld xmlns:a="http://schemas.openxmlformats.org/drawingml/2006/main" xmlns:r="http://schemas.openxmlformats.org/officeDocument/2006/relationships" xmlns:p="http://schemas.openxmlformats.org/presentationml/2006/main" show="0">
   <p:cSld>
     <p:spTree>
@@ -8174,7 +9575,7 @@
               <a:t>/mdk-1</a:t>
             </a:r>
             <a:r>
-              <a:rPr lang="en-US" sz="1600" smtClean="0">
+              <a:rPr lang="en-US" sz="1600" dirty="0" smtClean="0">
                 <a:latin typeface="Apple Symbols" charset="0"/>
                 <a:ea typeface="Apple Symbols" charset="0"/>
                 <a:cs typeface="Apple Symbols" charset="0"/>
@@ -8182,7 +9583,7 @@
               <a:t>80509</a:t>
             </a:r>
             <a:r>
-              <a:rPr lang="mr-IN" sz="1600" smtClean="0">
+              <a:rPr lang="mr-IN" sz="1600" dirty="0" smtClean="0">
                 <a:latin typeface="Apple Symbols" charset="0"/>
                 <a:ea typeface="Apple Symbols" charset="0"/>
                 <a:cs typeface="Apple Symbols" charset="0"/>
@@ -8216,7 +9617,7 @@
         <p:spPr>
           <a:xfrm>
             <a:off x="457198" y="1768867"/>
-            <a:ext cx="7620000" cy="2947063"/>
+            <a:ext cx="7620000" cy="3360889"/>
           </a:xfrm>
           <a:prstGeom prst="rect">
             <a:avLst/>
@@ -8662,8 +10063,22 @@
                 <a:ea typeface="Calibri" charset="0"/>
                 <a:cs typeface="Calibri" charset="0"/>
               </a:rPr>
-              <a:t> directory and execute the following command:</a:t>
-            </a:r>
+              <a:t> directory and execute the following command</a:t>
+            </a:r>
+            <a:r>
+              <a:rPr lang="en-US" dirty="0" smtClean="0">
+                <a:latin typeface="Calibri" charset="0"/>
+                <a:ea typeface="Calibri" charset="0"/>
+                <a:cs typeface="Calibri" charset="0"/>
+              </a:rPr>
+              <a:t>:</a:t>
+            </a:r>
+          </a:p>
+          <a:p>
+            <a:pPr marL="742950" lvl="1" indent="-285750">
+              <a:buFont typeface="Arial"/>
+              <a:buChar char="•"/>
+            </a:pPr>
             <a:endParaRPr lang="en-US" dirty="0">
               <a:latin typeface="Calibri" charset="0"/>
               <a:ea typeface="Calibri" charset="0"/>
@@ -8805,10 +10220,44 @@
           </a:p>
         </p:txBody>
       </p:sp>
+      <p:sp>
+        <p:nvSpPr>
+          <p:cNvPr id="2" name="TextBox 1"/>
+          <p:cNvSpPr txBox="1"/>
+          <p:nvPr/>
+        </p:nvSpPr>
+        <p:spPr>
+          <a:xfrm>
+            <a:off x="6815469" y="5996763"/>
+            <a:ext cx="1648047" cy="369332"/>
+          </a:xfrm>
+          <a:prstGeom prst="rect">
+            <a:avLst/>
+          </a:prstGeom>
+          <a:noFill/>
+        </p:spPr>
+        <p:txBody>
+          <a:bodyPr wrap="square" rtlCol="0">
+            <a:spAutoFit/>
+          </a:bodyPr>
+          <a:lstStyle/>
+          <a:p>
+            <a:r>
+              <a:rPr lang="en-GB" dirty="0" smtClean="0"/>
+              <a:t>Continued </a:t>
+            </a:r>
+            <a:r>
+              <a:rPr lang="mr-IN" dirty="0" smtClean="0"/>
+              <a:t>…</a:t>
+            </a:r>
+            <a:endParaRPr lang="en-GB" dirty="0"/>
+          </a:p>
+        </p:txBody>
+      </p:sp>
     </p:spTree>
     <p:extLst>
       <p:ext uri="{BB962C8B-B14F-4D97-AF65-F5344CB8AC3E}">
-        <p14:creationId xmlns:p14="http://schemas.microsoft.com/office/powerpoint/2010/main" val="2553385727"/>
+        <p14:creationId xmlns:p14="http://schemas.microsoft.com/office/powerpoint/2010/main" val="748902881"/>
       </p:ext>
     </p:extLst>
   </p:cSld>
@@ -8845,755 +10294,8 @@
         </p:nvSpPr>
         <p:spPr>
           <a:xfrm>
-            <a:off x="457195" y="2484832"/>
-            <a:ext cx="7620000" cy="577826"/>
-          </a:xfrm>
-          <a:prstGeom prst="rect">
-            <a:avLst/>
-          </a:prstGeom>
-        </p:spPr>
-        <p:txBody>
-          <a:bodyPr vert="horz" lIns="91440" tIns="45720" rIns="91440" bIns="45720" rtlCol="0">
-            <a:normAutofit/>
-          </a:bodyPr>
-          <a:lstStyle>
-            <a:lvl1pPr marL="0" indent="0" algn="l" defTabSz="914400" rtl="0" eaLnBrk="1" latinLnBrk="0" hangingPunct="1">
-              <a:spcBef>
-                <a:spcPct val="20000"/>
-              </a:spcBef>
-              <a:spcAft>
-                <a:spcPts val="600"/>
-              </a:spcAft>
-              <a:buFont typeface="Arial" pitchFamily="34" charset="0"/>
-              <a:buNone/>
-              <a:defRPr sz="2000" b="1" kern="1200">
-                <a:solidFill>
-                  <a:schemeClr val="tx1"/>
-                </a:solidFill>
-                <a:latin typeface="+mn-lt"/>
-                <a:ea typeface="+mn-ea"/>
-                <a:cs typeface="+mn-cs"/>
-              </a:defRPr>
-            </a:lvl1pPr>
-            <a:lvl2pPr marL="457200" indent="-182880" algn="l" defTabSz="914400" rtl="0" eaLnBrk="1" latinLnBrk="0" hangingPunct="1">
-              <a:spcBef>
-                <a:spcPct val="20000"/>
-              </a:spcBef>
-              <a:buClr>
-                <a:schemeClr val="tx2"/>
-              </a:buClr>
-              <a:buFont typeface="Arial" pitchFamily="34" charset="0"/>
-              <a:buChar char="•"/>
-              <a:defRPr sz="2000" kern="1200">
-                <a:solidFill>
-                  <a:schemeClr val="tx1"/>
-                </a:solidFill>
-                <a:latin typeface="+mn-lt"/>
-                <a:ea typeface="+mn-ea"/>
-                <a:cs typeface="+mn-cs"/>
-              </a:defRPr>
-            </a:lvl2pPr>
-            <a:lvl3pPr marL="1143000" indent="-228600" algn="l" defTabSz="914400" rtl="0" eaLnBrk="1" latinLnBrk="0" hangingPunct="1">
-              <a:spcBef>
-                <a:spcPct val="20000"/>
-              </a:spcBef>
-              <a:buClr>
-                <a:schemeClr val="tx2"/>
-              </a:buClr>
-              <a:buFont typeface="Arial" pitchFamily="34" charset="0"/>
-              <a:buChar char="•"/>
-              <a:defRPr sz="1800" kern="1200">
-                <a:solidFill>
-                  <a:schemeClr val="tx1"/>
-                </a:solidFill>
-                <a:latin typeface="+mn-lt"/>
-                <a:ea typeface="+mn-ea"/>
-                <a:cs typeface="+mn-cs"/>
-              </a:defRPr>
-            </a:lvl3pPr>
-            <a:lvl4pPr marL="1600200" indent="-228600" algn="l" defTabSz="914400" rtl="0" eaLnBrk="1" latinLnBrk="0" hangingPunct="1">
-              <a:spcBef>
-                <a:spcPct val="20000"/>
-              </a:spcBef>
-              <a:buClr>
-                <a:schemeClr val="tx2"/>
-              </a:buClr>
-              <a:buFont typeface="Arial" pitchFamily="34" charset="0"/>
-              <a:buChar char="•"/>
-              <a:defRPr sz="1800" kern="1200">
-                <a:solidFill>
-                  <a:schemeClr val="tx1"/>
-                </a:solidFill>
-                <a:latin typeface="+mn-lt"/>
-                <a:ea typeface="+mn-ea"/>
-                <a:cs typeface="+mn-cs"/>
-              </a:defRPr>
-            </a:lvl4pPr>
-            <a:lvl5pPr marL="2057400" indent="-228600" algn="l" defTabSz="914400" rtl="0" eaLnBrk="1" latinLnBrk="0" hangingPunct="1">
-              <a:spcBef>
-                <a:spcPct val="20000"/>
-              </a:spcBef>
-              <a:buClr>
-                <a:schemeClr val="tx2"/>
-              </a:buClr>
-              <a:buFont typeface="Arial" pitchFamily="34" charset="0"/>
-              <a:buChar char="•"/>
-              <a:defRPr sz="1800" kern="1200" baseline="0">
-                <a:solidFill>
-                  <a:schemeClr val="tx1"/>
-                </a:solidFill>
-                <a:latin typeface="+mn-lt"/>
-                <a:ea typeface="+mn-ea"/>
-                <a:cs typeface="+mn-cs"/>
-              </a:defRPr>
-            </a:lvl5pPr>
-            <a:lvl6pPr marL="2514600" indent="-228600" algn="l" defTabSz="914400" rtl="0" eaLnBrk="1" latinLnBrk="0" hangingPunct="1">
-              <a:spcBef>
-                <a:spcPct val="20000"/>
-              </a:spcBef>
-              <a:buClr>
-                <a:schemeClr val="tx2"/>
-              </a:buClr>
-              <a:buFont typeface="Arial" pitchFamily="34" charset="0"/>
-              <a:buChar char="•"/>
-              <a:defRPr sz="1600" kern="1200">
-                <a:solidFill>
-                  <a:schemeClr val="tx1"/>
-                </a:solidFill>
-                <a:latin typeface="+mn-lt"/>
-                <a:ea typeface="+mn-ea"/>
-                <a:cs typeface="+mn-cs"/>
-              </a:defRPr>
-            </a:lvl6pPr>
-            <a:lvl7pPr marL="2971800" indent="-228600" algn="l" defTabSz="914400" rtl="0" eaLnBrk="1" latinLnBrk="0" hangingPunct="1">
-              <a:spcBef>
-                <a:spcPct val="20000"/>
-              </a:spcBef>
-              <a:buClr>
-                <a:schemeClr val="tx2"/>
-              </a:buClr>
-              <a:buFont typeface="Arial" pitchFamily="34" charset="0"/>
-              <a:buChar char="•"/>
-              <a:defRPr sz="1600" kern="1200">
-                <a:solidFill>
-                  <a:schemeClr val="tx1"/>
-                </a:solidFill>
-                <a:latin typeface="+mn-lt"/>
-                <a:ea typeface="+mn-ea"/>
-                <a:cs typeface="+mn-cs"/>
-              </a:defRPr>
-            </a:lvl7pPr>
-            <a:lvl8pPr marL="3429000" indent="-228600" algn="l" defTabSz="914400" rtl="0" eaLnBrk="1" latinLnBrk="0" hangingPunct="1">
-              <a:spcBef>
-                <a:spcPct val="20000"/>
-              </a:spcBef>
-              <a:buClr>
-                <a:schemeClr val="tx2"/>
-              </a:buClr>
-              <a:buFont typeface="Arial" pitchFamily="34" charset="0"/>
-              <a:buChar char="•"/>
-              <a:defRPr sz="1600" kern="1200">
-                <a:solidFill>
-                  <a:schemeClr val="tx1"/>
-                </a:solidFill>
-                <a:latin typeface="+mn-lt"/>
-                <a:ea typeface="+mn-ea"/>
-                <a:cs typeface="+mn-cs"/>
-              </a:defRPr>
-            </a:lvl8pPr>
-            <a:lvl9pPr marL="3886200" indent="-228600" algn="l" defTabSz="914400" rtl="0" eaLnBrk="1" latinLnBrk="0" hangingPunct="1">
-              <a:spcBef>
-                <a:spcPct val="20000"/>
-              </a:spcBef>
-              <a:buClr>
-                <a:schemeClr val="tx2"/>
-              </a:buClr>
-              <a:buFont typeface="Arial" pitchFamily="34" charset="0"/>
-              <a:buChar char="•"/>
-              <a:defRPr sz="1600" kern="1200">
-                <a:solidFill>
-                  <a:schemeClr val="tx1"/>
-                </a:solidFill>
-                <a:latin typeface="+mn-lt"/>
-                <a:ea typeface="+mn-ea"/>
-                <a:cs typeface="+mn-cs"/>
-              </a:defRPr>
-            </a:lvl9pPr>
-          </a:lstStyle>
-          <a:p>
-            <a:pPr marL="285750" indent="-285750">
-              <a:buFont typeface="Arial"/>
-              <a:buChar char="•"/>
-            </a:pPr>
-            <a:r>
-              <a:rPr lang="en-US" b="0" dirty="0" smtClean="0">
-                <a:latin typeface="Calibri" charset="0"/>
-                <a:ea typeface="Calibri" charset="0"/>
-                <a:cs typeface="Calibri" charset="0"/>
-              </a:rPr>
-              <a:t>In your workstation: open a new terminal window and type in:</a:t>
-            </a:r>
-          </a:p>
-        </p:txBody>
-      </p:sp>
-      <p:sp>
-        <p:nvSpPr>
-          <p:cNvPr id="7" name="TextBox 6"/>
-          <p:cNvSpPr txBox="1"/>
-          <p:nvPr/>
-        </p:nvSpPr>
-        <p:spPr>
-          <a:xfrm>
-            <a:off x="771629" y="2771877"/>
-            <a:ext cx="5124898" cy="338554"/>
-          </a:xfrm>
-          <a:prstGeom prst="rect">
-            <a:avLst/>
-          </a:prstGeom>
-          <a:noFill/>
-        </p:spPr>
-        <p:txBody>
-          <a:bodyPr wrap="square" rtlCol="0">
-            <a:spAutoFit/>
-          </a:bodyPr>
-          <a:lstStyle/>
-          <a:p>
-            <a:r>
-              <a:rPr lang="en-US" sz="1600" dirty="0" smtClean="0">
-                <a:latin typeface="Apple Symbols" charset="0"/>
-                <a:ea typeface="Apple Symbols" charset="0"/>
-                <a:cs typeface="Apple Symbols" charset="0"/>
-              </a:rPr>
-              <a:t>$ </a:t>
-            </a:r>
-            <a:r>
-              <a:rPr lang="en-US" sz="1600" dirty="0" err="1">
-                <a:latin typeface="Apple Symbols" charset="0"/>
-                <a:ea typeface="Apple Symbols" charset="0"/>
-                <a:cs typeface="Apple Symbols" charset="0"/>
-              </a:rPr>
-              <a:t>ssh</a:t>
-            </a:r>
-            <a:r>
-              <a:rPr lang="en-US" sz="1600" dirty="0">
-                <a:latin typeface="Apple Symbols" charset="0"/>
-                <a:ea typeface="Apple Symbols" charset="0"/>
-                <a:cs typeface="Apple Symbols" charset="0"/>
-              </a:rPr>
-              <a:t> root@&lt;</a:t>
-            </a:r>
-            <a:r>
-              <a:rPr lang="en-US" sz="1600" dirty="0" err="1">
-                <a:latin typeface="Apple Symbols" charset="0"/>
-                <a:ea typeface="Apple Symbols" charset="0"/>
-                <a:cs typeface="Apple Symbols" charset="0"/>
-              </a:rPr>
-              <a:t>Put_Here_IP_Of_MIRO_Found_In_Android_App</a:t>
-            </a:r>
-            <a:r>
-              <a:rPr lang="en-US" sz="1600" dirty="0">
-                <a:latin typeface="Apple Symbols" charset="0"/>
-                <a:ea typeface="Apple Symbols" charset="0"/>
-                <a:cs typeface="Apple Symbols" charset="0"/>
-              </a:rPr>
-              <a:t>&gt;</a:t>
-            </a:r>
-            <a:endParaRPr lang="en-US" sz="1600" dirty="0" smtClean="0">
-              <a:latin typeface="Apple Symbols" charset="0"/>
-              <a:ea typeface="Apple Symbols" charset="0"/>
-              <a:cs typeface="Apple Symbols" charset="0"/>
-            </a:endParaRPr>
-          </a:p>
-        </p:txBody>
-      </p:sp>
-      <p:sp>
-        <p:nvSpPr>
-          <p:cNvPr id="8" name="Content Placeholder 3"/>
-          <p:cNvSpPr txBox="1">
-            <a:spLocks/>
-          </p:cNvSpPr>
-          <p:nvPr/>
-        </p:nvSpPr>
-        <p:spPr>
-          <a:xfrm>
-            <a:off x="457195" y="2175508"/>
-            <a:ext cx="7620000" cy="358164"/>
-          </a:xfrm>
-          <a:prstGeom prst="rect">
-            <a:avLst/>
-          </a:prstGeom>
-        </p:spPr>
-        <p:txBody>
-          <a:bodyPr vert="horz" lIns="91440" tIns="45720" rIns="91440" bIns="45720" rtlCol="0">
-            <a:normAutofit fontScale="92500" lnSpcReduction="10000"/>
-          </a:bodyPr>
-          <a:lstStyle>
-            <a:lvl1pPr marL="0" indent="0" algn="l" defTabSz="914400" rtl="0" eaLnBrk="1" latinLnBrk="0" hangingPunct="1">
-              <a:spcBef>
-                <a:spcPct val="20000"/>
-              </a:spcBef>
-              <a:spcAft>
-                <a:spcPts val="600"/>
-              </a:spcAft>
-              <a:buFont typeface="Arial" pitchFamily="34" charset="0"/>
-              <a:buNone/>
-              <a:defRPr sz="2000" b="1" kern="1200">
-                <a:solidFill>
-                  <a:schemeClr val="tx1"/>
-                </a:solidFill>
-                <a:latin typeface="+mn-lt"/>
-                <a:ea typeface="+mn-ea"/>
-                <a:cs typeface="+mn-cs"/>
-              </a:defRPr>
-            </a:lvl1pPr>
-            <a:lvl2pPr marL="457200" indent="-182880" algn="l" defTabSz="914400" rtl="0" eaLnBrk="1" latinLnBrk="0" hangingPunct="1">
-              <a:spcBef>
-                <a:spcPct val="20000"/>
-              </a:spcBef>
-              <a:buClr>
-                <a:schemeClr val="tx2"/>
-              </a:buClr>
-              <a:buFont typeface="Arial" pitchFamily="34" charset="0"/>
-              <a:buChar char="•"/>
-              <a:defRPr sz="2000" kern="1200">
-                <a:solidFill>
-                  <a:schemeClr val="tx1"/>
-                </a:solidFill>
-                <a:latin typeface="+mn-lt"/>
-                <a:ea typeface="+mn-ea"/>
-                <a:cs typeface="+mn-cs"/>
-              </a:defRPr>
-            </a:lvl2pPr>
-            <a:lvl3pPr marL="1143000" indent="-228600" algn="l" defTabSz="914400" rtl="0" eaLnBrk="1" latinLnBrk="0" hangingPunct="1">
-              <a:spcBef>
-                <a:spcPct val="20000"/>
-              </a:spcBef>
-              <a:buClr>
-                <a:schemeClr val="tx2"/>
-              </a:buClr>
-              <a:buFont typeface="Arial" pitchFamily="34" charset="0"/>
-              <a:buChar char="•"/>
-              <a:defRPr sz="1800" kern="1200">
-                <a:solidFill>
-                  <a:schemeClr val="tx1"/>
-                </a:solidFill>
-                <a:latin typeface="+mn-lt"/>
-                <a:ea typeface="+mn-ea"/>
-                <a:cs typeface="+mn-cs"/>
-              </a:defRPr>
-            </a:lvl3pPr>
-            <a:lvl4pPr marL="1600200" indent="-228600" algn="l" defTabSz="914400" rtl="0" eaLnBrk="1" latinLnBrk="0" hangingPunct="1">
-              <a:spcBef>
-                <a:spcPct val="20000"/>
-              </a:spcBef>
-              <a:buClr>
-                <a:schemeClr val="tx2"/>
-              </a:buClr>
-              <a:buFont typeface="Arial" pitchFamily="34" charset="0"/>
-              <a:buChar char="•"/>
-              <a:defRPr sz="1800" kern="1200">
-                <a:solidFill>
-                  <a:schemeClr val="tx1"/>
-                </a:solidFill>
-                <a:latin typeface="+mn-lt"/>
-                <a:ea typeface="+mn-ea"/>
-                <a:cs typeface="+mn-cs"/>
-              </a:defRPr>
-            </a:lvl4pPr>
-            <a:lvl5pPr marL="2057400" indent="-228600" algn="l" defTabSz="914400" rtl="0" eaLnBrk="1" latinLnBrk="0" hangingPunct="1">
-              <a:spcBef>
-                <a:spcPct val="20000"/>
-              </a:spcBef>
-              <a:buClr>
-                <a:schemeClr val="tx2"/>
-              </a:buClr>
-              <a:buFont typeface="Arial" pitchFamily="34" charset="0"/>
-              <a:buChar char="•"/>
-              <a:defRPr sz="1800" kern="1200" baseline="0">
-                <a:solidFill>
-                  <a:schemeClr val="tx1"/>
-                </a:solidFill>
-                <a:latin typeface="+mn-lt"/>
-                <a:ea typeface="+mn-ea"/>
-                <a:cs typeface="+mn-cs"/>
-              </a:defRPr>
-            </a:lvl5pPr>
-            <a:lvl6pPr marL="2514600" indent="-228600" algn="l" defTabSz="914400" rtl="0" eaLnBrk="1" latinLnBrk="0" hangingPunct="1">
-              <a:spcBef>
-                <a:spcPct val="20000"/>
-              </a:spcBef>
-              <a:buClr>
-                <a:schemeClr val="tx2"/>
-              </a:buClr>
-              <a:buFont typeface="Arial" pitchFamily="34" charset="0"/>
-              <a:buChar char="•"/>
-              <a:defRPr sz="1600" kern="1200">
-                <a:solidFill>
-                  <a:schemeClr val="tx1"/>
-                </a:solidFill>
-                <a:latin typeface="+mn-lt"/>
-                <a:ea typeface="+mn-ea"/>
-                <a:cs typeface="+mn-cs"/>
-              </a:defRPr>
-            </a:lvl6pPr>
-            <a:lvl7pPr marL="2971800" indent="-228600" algn="l" defTabSz="914400" rtl="0" eaLnBrk="1" latinLnBrk="0" hangingPunct="1">
-              <a:spcBef>
-                <a:spcPct val="20000"/>
-              </a:spcBef>
-              <a:buClr>
-                <a:schemeClr val="tx2"/>
-              </a:buClr>
-              <a:buFont typeface="Arial" pitchFamily="34" charset="0"/>
-              <a:buChar char="•"/>
-              <a:defRPr sz="1600" kern="1200">
-                <a:solidFill>
-                  <a:schemeClr val="tx1"/>
-                </a:solidFill>
-                <a:latin typeface="+mn-lt"/>
-                <a:ea typeface="+mn-ea"/>
-                <a:cs typeface="+mn-cs"/>
-              </a:defRPr>
-            </a:lvl7pPr>
-            <a:lvl8pPr marL="3429000" indent="-228600" algn="l" defTabSz="914400" rtl="0" eaLnBrk="1" latinLnBrk="0" hangingPunct="1">
-              <a:spcBef>
-                <a:spcPct val="20000"/>
-              </a:spcBef>
-              <a:buClr>
-                <a:schemeClr val="tx2"/>
-              </a:buClr>
-              <a:buFont typeface="Arial" pitchFamily="34" charset="0"/>
-              <a:buChar char="•"/>
-              <a:defRPr sz="1600" kern="1200">
-                <a:solidFill>
-                  <a:schemeClr val="tx1"/>
-                </a:solidFill>
-                <a:latin typeface="+mn-lt"/>
-                <a:ea typeface="+mn-ea"/>
-                <a:cs typeface="+mn-cs"/>
-              </a:defRPr>
-            </a:lvl8pPr>
-            <a:lvl9pPr marL="3886200" indent="-228600" algn="l" defTabSz="914400" rtl="0" eaLnBrk="1" latinLnBrk="0" hangingPunct="1">
-              <a:spcBef>
-                <a:spcPct val="20000"/>
-              </a:spcBef>
-              <a:buClr>
-                <a:schemeClr val="tx2"/>
-              </a:buClr>
-              <a:buFont typeface="Arial" pitchFamily="34" charset="0"/>
-              <a:buChar char="•"/>
-              <a:defRPr sz="1600" kern="1200">
-                <a:solidFill>
-                  <a:schemeClr val="tx1"/>
-                </a:solidFill>
-                <a:latin typeface="+mn-lt"/>
-                <a:ea typeface="+mn-ea"/>
-                <a:cs typeface="+mn-cs"/>
-              </a:defRPr>
-            </a:lvl9pPr>
-          </a:lstStyle>
-          <a:p>
-            <a:pPr marL="285750" indent="-285750">
-              <a:buFont typeface="Arial"/>
-              <a:buChar char="•"/>
-            </a:pPr>
-            <a:r>
-              <a:rPr lang="en-US" b="0" dirty="0" smtClean="0">
-                <a:latin typeface="Calibri" charset="0"/>
-                <a:ea typeface="Calibri" charset="0"/>
-                <a:cs typeface="Calibri" charset="0"/>
-              </a:rPr>
-              <a:t>In the smartphone: open the </a:t>
-            </a:r>
-            <a:r>
-              <a:rPr lang="en-US" b="0" dirty="0" err="1" smtClean="0">
-                <a:solidFill>
-                  <a:srgbClr val="D1282E"/>
-                </a:solidFill>
-                <a:latin typeface="Calibri" charset="0"/>
-                <a:ea typeface="Calibri" charset="0"/>
-                <a:cs typeface="Calibri" charset="0"/>
-              </a:rPr>
-              <a:t>MIROapp</a:t>
-            </a:r>
-            <a:r>
-              <a:rPr lang="en-US" b="0" dirty="0" smtClean="0">
-                <a:solidFill>
-                  <a:srgbClr val="D1282E"/>
-                </a:solidFill>
-                <a:latin typeface="Calibri" charset="0"/>
-                <a:ea typeface="Calibri" charset="0"/>
-                <a:cs typeface="Calibri" charset="0"/>
-              </a:rPr>
-              <a:t> </a:t>
-            </a:r>
-            <a:r>
-              <a:rPr lang="en-US" b="0" dirty="0" smtClean="0">
-                <a:latin typeface="Calibri" charset="0"/>
-                <a:ea typeface="Calibri" charset="0"/>
-                <a:cs typeface="Calibri" charset="0"/>
-              </a:rPr>
-              <a:t>and check its </a:t>
-            </a:r>
-            <a:r>
-              <a:rPr lang="en-US" b="0" dirty="0" smtClean="0">
-                <a:solidFill>
-                  <a:srgbClr val="D1282E"/>
-                </a:solidFill>
-                <a:latin typeface="Calibri" charset="0"/>
-                <a:ea typeface="Calibri" charset="0"/>
-                <a:cs typeface="Calibri" charset="0"/>
-              </a:rPr>
-              <a:t>IP address</a:t>
-            </a:r>
-          </a:p>
-        </p:txBody>
-      </p:sp>
-      <p:sp>
-        <p:nvSpPr>
-          <p:cNvPr id="9" name="Content Placeholder 3"/>
-          <p:cNvSpPr txBox="1">
-            <a:spLocks/>
-          </p:cNvSpPr>
-          <p:nvPr/>
-        </p:nvSpPr>
-        <p:spPr>
-          <a:xfrm>
-            <a:off x="457193" y="3083924"/>
-            <a:ext cx="7620000" cy="577826"/>
-          </a:xfrm>
-          <a:prstGeom prst="rect">
-            <a:avLst/>
-          </a:prstGeom>
-        </p:spPr>
-        <p:txBody>
-          <a:bodyPr vert="horz" lIns="91440" tIns="45720" rIns="91440" bIns="45720" rtlCol="0">
-            <a:normAutofit/>
-          </a:bodyPr>
-          <a:lstStyle>
-            <a:lvl1pPr marL="0" indent="0" algn="l" defTabSz="914400" rtl="0" eaLnBrk="1" latinLnBrk="0" hangingPunct="1">
-              <a:spcBef>
-                <a:spcPct val="20000"/>
-              </a:spcBef>
-              <a:spcAft>
-                <a:spcPts val="600"/>
-              </a:spcAft>
-              <a:buFont typeface="Arial" pitchFamily="34" charset="0"/>
-              <a:buNone/>
-              <a:defRPr sz="2000" b="1" kern="1200">
-                <a:solidFill>
-                  <a:schemeClr val="tx1"/>
-                </a:solidFill>
-                <a:latin typeface="+mn-lt"/>
-                <a:ea typeface="+mn-ea"/>
-                <a:cs typeface="+mn-cs"/>
-              </a:defRPr>
-            </a:lvl1pPr>
-            <a:lvl2pPr marL="457200" indent="-182880" algn="l" defTabSz="914400" rtl="0" eaLnBrk="1" latinLnBrk="0" hangingPunct="1">
-              <a:spcBef>
-                <a:spcPct val="20000"/>
-              </a:spcBef>
-              <a:buClr>
-                <a:schemeClr val="tx2"/>
-              </a:buClr>
-              <a:buFont typeface="Arial" pitchFamily="34" charset="0"/>
-              <a:buChar char="•"/>
-              <a:defRPr sz="2000" kern="1200">
-                <a:solidFill>
-                  <a:schemeClr val="tx1"/>
-                </a:solidFill>
-                <a:latin typeface="+mn-lt"/>
-                <a:ea typeface="+mn-ea"/>
-                <a:cs typeface="+mn-cs"/>
-              </a:defRPr>
-            </a:lvl2pPr>
-            <a:lvl3pPr marL="1143000" indent="-228600" algn="l" defTabSz="914400" rtl="0" eaLnBrk="1" latinLnBrk="0" hangingPunct="1">
-              <a:spcBef>
-                <a:spcPct val="20000"/>
-              </a:spcBef>
-              <a:buClr>
-                <a:schemeClr val="tx2"/>
-              </a:buClr>
-              <a:buFont typeface="Arial" pitchFamily="34" charset="0"/>
-              <a:buChar char="•"/>
-              <a:defRPr sz="1800" kern="1200">
-                <a:solidFill>
-                  <a:schemeClr val="tx1"/>
-                </a:solidFill>
-                <a:latin typeface="+mn-lt"/>
-                <a:ea typeface="+mn-ea"/>
-                <a:cs typeface="+mn-cs"/>
-              </a:defRPr>
-            </a:lvl3pPr>
-            <a:lvl4pPr marL="1600200" indent="-228600" algn="l" defTabSz="914400" rtl="0" eaLnBrk="1" latinLnBrk="0" hangingPunct="1">
-              <a:spcBef>
-                <a:spcPct val="20000"/>
-              </a:spcBef>
-              <a:buClr>
-                <a:schemeClr val="tx2"/>
-              </a:buClr>
-              <a:buFont typeface="Arial" pitchFamily="34" charset="0"/>
-              <a:buChar char="•"/>
-              <a:defRPr sz="1800" kern="1200">
-                <a:solidFill>
-                  <a:schemeClr val="tx1"/>
-                </a:solidFill>
-                <a:latin typeface="+mn-lt"/>
-                <a:ea typeface="+mn-ea"/>
-                <a:cs typeface="+mn-cs"/>
-              </a:defRPr>
-            </a:lvl4pPr>
-            <a:lvl5pPr marL="2057400" indent="-228600" algn="l" defTabSz="914400" rtl="0" eaLnBrk="1" latinLnBrk="0" hangingPunct="1">
-              <a:spcBef>
-                <a:spcPct val="20000"/>
-              </a:spcBef>
-              <a:buClr>
-                <a:schemeClr val="tx2"/>
-              </a:buClr>
-              <a:buFont typeface="Arial" pitchFamily="34" charset="0"/>
-              <a:buChar char="•"/>
-              <a:defRPr sz="1800" kern="1200" baseline="0">
-                <a:solidFill>
-                  <a:schemeClr val="tx1"/>
-                </a:solidFill>
-                <a:latin typeface="+mn-lt"/>
-                <a:ea typeface="+mn-ea"/>
-                <a:cs typeface="+mn-cs"/>
-              </a:defRPr>
-            </a:lvl5pPr>
-            <a:lvl6pPr marL="2514600" indent="-228600" algn="l" defTabSz="914400" rtl="0" eaLnBrk="1" latinLnBrk="0" hangingPunct="1">
-              <a:spcBef>
-                <a:spcPct val="20000"/>
-              </a:spcBef>
-              <a:buClr>
-                <a:schemeClr val="tx2"/>
-              </a:buClr>
-              <a:buFont typeface="Arial" pitchFamily="34" charset="0"/>
-              <a:buChar char="•"/>
-              <a:defRPr sz="1600" kern="1200">
-                <a:solidFill>
-                  <a:schemeClr val="tx1"/>
-                </a:solidFill>
-                <a:latin typeface="+mn-lt"/>
-                <a:ea typeface="+mn-ea"/>
-                <a:cs typeface="+mn-cs"/>
-              </a:defRPr>
-            </a:lvl6pPr>
-            <a:lvl7pPr marL="2971800" indent="-228600" algn="l" defTabSz="914400" rtl="0" eaLnBrk="1" latinLnBrk="0" hangingPunct="1">
-              <a:spcBef>
-                <a:spcPct val="20000"/>
-              </a:spcBef>
-              <a:buClr>
-                <a:schemeClr val="tx2"/>
-              </a:buClr>
-              <a:buFont typeface="Arial" pitchFamily="34" charset="0"/>
-              <a:buChar char="•"/>
-              <a:defRPr sz="1600" kern="1200">
-                <a:solidFill>
-                  <a:schemeClr val="tx1"/>
-                </a:solidFill>
-                <a:latin typeface="+mn-lt"/>
-                <a:ea typeface="+mn-ea"/>
-                <a:cs typeface="+mn-cs"/>
-              </a:defRPr>
-            </a:lvl7pPr>
-            <a:lvl8pPr marL="3429000" indent="-228600" algn="l" defTabSz="914400" rtl="0" eaLnBrk="1" latinLnBrk="0" hangingPunct="1">
-              <a:spcBef>
-                <a:spcPct val="20000"/>
-              </a:spcBef>
-              <a:buClr>
-                <a:schemeClr val="tx2"/>
-              </a:buClr>
-              <a:buFont typeface="Arial" pitchFamily="34" charset="0"/>
-              <a:buChar char="•"/>
-              <a:defRPr sz="1600" kern="1200">
-                <a:solidFill>
-                  <a:schemeClr val="tx1"/>
-                </a:solidFill>
-                <a:latin typeface="+mn-lt"/>
-                <a:ea typeface="+mn-ea"/>
-                <a:cs typeface="+mn-cs"/>
-              </a:defRPr>
-            </a:lvl8pPr>
-            <a:lvl9pPr marL="3886200" indent="-228600" algn="l" defTabSz="914400" rtl="0" eaLnBrk="1" latinLnBrk="0" hangingPunct="1">
-              <a:spcBef>
-                <a:spcPct val="20000"/>
-              </a:spcBef>
-              <a:buClr>
-                <a:schemeClr val="tx2"/>
-              </a:buClr>
-              <a:buFont typeface="Arial" pitchFamily="34" charset="0"/>
-              <a:buChar char="•"/>
-              <a:defRPr sz="1600" kern="1200">
-                <a:solidFill>
-                  <a:schemeClr val="tx1"/>
-                </a:solidFill>
-                <a:latin typeface="+mn-lt"/>
-                <a:ea typeface="+mn-ea"/>
-                <a:cs typeface="+mn-cs"/>
-              </a:defRPr>
-            </a:lvl9pPr>
-          </a:lstStyle>
-          <a:p>
-            <a:pPr marL="285750" indent="-285750">
-              <a:buFont typeface="Arial"/>
-              <a:buChar char="•"/>
-            </a:pPr>
-            <a:r>
-              <a:rPr lang="en-US" b="0" dirty="0" smtClean="0">
-                <a:latin typeface="Calibri" charset="0"/>
-                <a:ea typeface="Calibri" charset="0"/>
-                <a:cs typeface="Calibri" charset="0"/>
-              </a:rPr>
-              <a:t>MIRO’s SSH entry password is:</a:t>
-            </a:r>
-          </a:p>
-        </p:txBody>
-      </p:sp>
-      <p:sp>
-        <p:nvSpPr>
-          <p:cNvPr id="11" name="TextBox 10"/>
-          <p:cNvSpPr txBox="1"/>
-          <p:nvPr/>
-        </p:nvSpPr>
-        <p:spPr>
-          <a:xfrm>
-            <a:off x="771627" y="3382838"/>
-            <a:ext cx="4976042" cy="338554"/>
-          </a:xfrm>
-          <a:prstGeom prst="rect">
-            <a:avLst/>
-          </a:prstGeom>
-          <a:noFill/>
-        </p:spPr>
-        <p:txBody>
-          <a:bodyPr wrap="square" rtlCol="0">
-            <a:spAutoFit/>
-          </a:bodyPr>
-          <a:lstStyle/>
-          <a:p>
-            <a:r>
-              <a:rPr lang="en-US" sz="1600" dirty="0" smtClean="0">
-                <a:latin typeface="Apple Symbols" charset="0"/>
-                <a:ea typeface="Apple Symbols" charset="0"/>
-                <a:cs typeface="Apple Symbols" charset="0"/>
-              </a:rPr>
-              <a:t>$ MIROOpen1</a:t>
-            </a:r>
-          </a:p>
-        </p:txBody>
-      </p:sp>
-      <p:sp>
-        <p:nvSpPr>
-          <p:cNvPr id="12" name="Content Placeholder 3"/>
-          <p:cNvSpPr txBox="1">
-            <a:spLocks/>
-          </p:cNvSpPr>
-          <p:nvPr/>
-        </p:nvSpPr>
-        <p:spPr>
-          <a:xfrm>
-            <a:off x="457193" y="3688257"/>
-            <a:ext cx="7620000" cy="352908"/>
+            <a:off x="457198" y="1768867"/>
+            <a:ext cx="7620000" cy="4461812"/>
           </a:xfrm>
           <a:prstGeom prst="rect">
             <a:avLst/>
@@ -9778,98 +10480,234 @@
                 <a:ea typeface="Calibri" charset="0"/>
                 <a:cs typeface="Calibri" charset="0"/>
               </a:rPr>
-              <a:t>Once inside MIRO’s Terminal, type in:</a:t>
-            </a:r>
-          </a:p>
-        </p:txBody>
-      </p:sp>
-      <p:sp>
-        <p:nvSpPr>
-          <p:cNvPr id="13" name="TextBox 12"/>
-          <p:cNvSpPr txBox="1"/>
-          <p:nvPr/>
-        </p:nvSpPr>
-        <p:spPr>
-          <a:xfrm>
-            <a:off x="760436" y="3992156"/>
-            <a:ext cx="4987232" cy="338554"/>
-          </a:xfrm>
-          <a:prstGeom prst="rect">
-            <a:avLst/>
-          </a:prstGeom>
-          <a:noFill/>
-        </p:spPr>
-        <p:txBody>
-          <a:bodyPr wrap="square" rtlCol="0">
-            <a:spAutoFit/>
-          </a:bodyPr>
-          <a:lstStyle/>
-          <a:p>
-            <a:r>
-              <a:rPr lang="en-US" sz="1600" dirty="0" smtClean="0">
-                <a:latin typeface="Apple Symbols" charset="0"/>
-                <a:ea typeface="Apple Symbols" charset="0"/>
-                <a:cs typeface="Apple Symbols" charset="0"/>
-              </a:rPr>
-              <a:t>$ </a:t>
-            </a:r>
-            <a:r>
-              <a:rPr lang="pt-BR" sz="1600" dirty="0" err="1">
-                <a:latin typeface="Apple Symbols" charset="0"/>
-                <a:ea typeface="Apple Symbols" charset="0"/>
-                <a:cs typeface="Apple Symbols" charset="0"/>
-              </a:rPr>
-              <a:t>sudo</a:t>
-            </a:r>
-            <a:r>
-              <a:rPr lang="pt-BR" sz="1600" dirty="0">
-                <a:latin typeface="Apple Symbols" charset="0"/>
-                <a:ea typeface="Apple Symbols" charset="0"/>
-                <a:cs typeface="Apple Symbols" charset="0"/>
-              </a:rPr>
-              <a:t> nano ~/.profile </a:t>
-            </a:r>
-            <a:endParaRPr lang="en-US" sz="1600" dirty="0" smtClean="0">
-              <a:latin typeface="Apple Symbols" charset="0"/>
-              <a:ea typeface="Apple Symbols" charset="0"/>
-              <a:cs typeface="Apple Symbols" charset="0"/>
-            </a:endParaRPr>
-          </a:p>
-        </p:txBody>
-      </p:sp>
-      <p:sp>
-        <p:nvSpPr>
-          <p:cNvPr id="3" name="TextBox 2"/>
-          <p:cNvSpPr txBox="1"/>
-          <p:nvPr/>
-        </p:nvSpPr>
-        <p:spPr>
-          <a:xfrm>
-            <a:off x="457193" y="5394172"/>
-            <a:ext cx="184731" cy="400110"/>
-          </a:xfrm>
-          <a:prstGeom prst="rect">
-            <a:avLst/>
-          </a:prstGeom>
-          <a:noFill/>
-        </p:spPr>
-        <p:txBody>
-          <a:bodyPr wrap="none" rtlCol="0">
-            <a:spAutoFit/>
-          </a:bodyPr>
-          <a:lstStyle/>
-          <a:p>
-            <a:endParaRPr lang="en-US" sz="2000" dirty="0">
+              <a:t>Download from: </a:t>
+            </a:r>
+            <a:r>
+              <a:rPr lang="en-US" b="0" dirty="0" smtClean="0">
+                <a:latin typeface="Calibri" charset="0"/>
+                <a:ea typeface="Calibri" charset="0"/>
+                <a:cs typeface="Calibri" charset="0"/>
+                <a:hlinkClick r:id="rId2"/>
+              </a:rPr>
+              <a:t>http://labs.consequentialrobotics.com/miro/mdk/</a:t>
+            </a:r>
+            <a:endParaRPr lang="en-US" b="0" dirty="0" smtClean="0">
               <a:latin typeface="Calibri" charset="0"/>
               <a:ea typeface="Calibri" charset="0"/>
               <a:cs typeface="Calibri" charset="0"/>
             </a:endParaRPr>
           </a:p>
-        </p:txBody>
-      </p:sp>
-      <p:sp>
-        <p:nvSpPr>
-          <p:cNvPr id="18" name="TextBox 17"/>
+          <a:p>
+            <a:pPr marL="742950" lvl="1" indent="-285750">
+              <a:buFont typeface="Arial"/>
+              <a:buChar char="•"/>
+            </a:pPr>
+            <a:r>
+              <a:rPr lang="en-US" b="0" dirty="0" smtClean="0">
+                <a:latin typeface="Calibri" charset="0"/>
+                <a:ea typeface="Calibri" charset="0"/>
+                <a:cs typeface="Calibri" charset="0"/>
+              </a:rPr>
+              <a:t>The </a:t>
+            </a:r>
+            <a:r>
+              <a:rPr lang="en-US" b="0" dirty="0" smtClean="0">
+                <a:solidFill>
+                  <a:srgbClr val="D1282E"/>
+                </a:solidFill>
+                <a:latin typeface="Calibri" charset="0"/>
+                <a:ea typeface="Calibri" charset="0"/>
+                <a:cs typeface="Calibri" charset="0"/>
+              </a:rPr>
+              <a:t>MDK (Complete Edition)</a:t>
+            </a:r>
+            <a:r>
+              <a:rPr lang="en-US" b="0" dirty="0" smtClean="0">
+                <a:latin typeface="Calibri" charset="0"/>
+                <a:ea typeface="Calibri" charset="0"/>
+                <a:cs typeface="Calibri" charset="0"/>
+              </a:rPr>
+              <a:t> onto your </a:t>
+            </a:r>
+            <a:r>
+              <a:rPr lang="en-US" b="0" dirty="0" smtClean="0">
+                <a:solidFill>
+                  <a:srgbClr val="D1282E"/>
+                </a:solidFill>
+                <a:latin typeface="Calibri" charset="0"/>
+                <a:ea typeface="Calibri" charset="0"/>
+                <a:cs typeface="Calibri" charset="0"/>
+              </a:rPr>
+              <a:t>workstation</a:t>
+            </a:r>
+          </a:p>
+          <a:p>
+            <a:pPr marL="742950" lvl="1" indent="-285750">
+              <a:buFont typeface="Arial"/>
+              <a:buChar char="•"/>
+            </a:pPr>
+            <a:r>
+              <a:rPr lang="en-US" b="0" dirty="0" smtClean="0">
+                <a:latin typeface="Calibri" charset="0"/>
+                <a:ea typeface="Calibri" charset="0"/>
+                <a:cs typeface="Calibri" charset="0"/>
+              </a:rPr>
+              <a:t>The </a:t>
+            </a:r>
+            <a:r>
+              <a:rPr lang="en-US" b="0" dirty="0" err="1" smtClean="0">
+                <a:solidFill>
+                  <a:srgbClr val="D1282E"/>
+                </a:solidFill>
+                <a:latin typeface="Calibri" charset="0"/>
+                <a:ea typeface="Calibri" charset="0"/>
+                <a:cs typeface="Calibri" charset="0"/>
+              </a:rPr>
+              <a:t>MIROapp</a:t>
+            </a:r>
+            <a:r>
+              <a:rPr lang="en-US" b="0" dirty="0" smtClean="0">
+                <a:latin typeface="Calibri" charset="0"/>
+                <a:ea typeface="Calibri" charset="0"/>
+                <a:cs typeface="Calibri" charset="0"/>
+              </a:rPr>
+              <a:t> onto your </a:t>
+            </a:r>
+            <a:r>
+              <a:rPr lang="en-US" b="0" dirty="0" smtClean="0">
+                <a:solidFill>
+                  <a:srgbClr val="D1282E"/>
+                </a:solidFill>
+                <a:latin typeface="Calibri" charset="0"/>
+                <a:ea typeface="Calibri" charset="0"/>
+                <a:cs typeface="Calibri" charset="0"/>
+              </a:rPr>
+              <a:t>Android mobile device </a:t>
+            </a:r>
+            <a:r>
+              <a:rPr lang="en-US" b="0" dirty="0" smtClean="0">
+                <a:latin typeface="Calibri" charset="0"/>
+                <a:ea typeface="Calibri" charset="0"/>
+                <a:cs typeface="Calibri" charset="0"/>
+              </a:rPr>
+              <a:t>directly </a:t>
+            </a:r>
+          </a:p>
+          <a:p>
+            <a:pPr marL="285750" indent="-285750">
+              <a:buFont typeface="Arial"/>
+              <a:buChar char="•"/>
+            </a:pPr>
+            <a:r>
+              <a:rPr lang="en-US" b="0" dirty="0" smtClean="0">
+                <a:latin typeface="Calibri" charset="0"/>
+                <a:ea typeface="Calibri" charset="0"/>
+                <a:cs typeface="Calibri" charset="0"/>
+              </a:rPr>
+              <a:t>Then</a:t>
+            </a:r>
+            <a:r>
+              <a:rPr lang="en-US" b="0" dirty="0" smtClean="0">
+                <a:latin typeface="Calibri" charset="0"/>
+                <a:ea typeface="Calibri" charset="0"/>
+                <a:cs typeface="Calibri" charset="0"/>
+              </a:rPr>
+              <a:t>, in your workstation</a:t>
+            </a:r>
+            <a:r>
+              <a:rPr lang="en-US" b="0" dirty="0" smtClean="0">
+                <a:latin typeface="Calibri" charset="0"/>
+                <a:ea typeface="Calibri" charset="0"/>
+                <a:cs typeface="Calibri" charset="0"/>
+              </a:rPr>
+              <a:t>:</a:t>
+            </a:r>
+            <a:endParaRPr lang="en-US" dirty="0">
+              <a:latin typeface="Calibri" charset="0"/>
+              <a:ea typeface="Calibri" charset="0"/>
+              <a:cs typeface="Calibri" charset="0"/>
+            </a:endParaRPr>
+          </a:p>
+          <a:p>
+            <a:pPr marL="742950" lvl="1" indent="-285750">
+              <a:buFont typeface="Arial"/>
+              <a:buChar char="•"/>
+            </a:pPr>
+            <a:r>
+              <a:rPr lang="en-US" dirty="0" smtClean="0">
+                <a:latin typeface="Calibri" charset="0"/>
+                <a:ea typeface="Calibri" charset="0"/>
+                <a:cs typeface="Calibri" charset="0"/>
+              </a:rPr>
+              <a:t>Finally, open your bash file by typing in:</a:t>
+            </a:r>
+          </a:p>
+          <a:p>
+            <a:pPr marL="742950" lvl="1" indent="-285750">
+              <a:buFont typeface="Arial"/>
+              <a:buChar char="•"/>
+            </a:pPr>
+            <a:endParaRPr lang="en-US" dirty="0" smtClean="0">
+              <a:latin typeface="Calibri" charset="0"/>
+              <a:ea typeface="Calibri" charset="0"/>
+              <a:cs typeface="Calibri" charset="0"/>
+            </a:endParaRPr>
+          </a:p>
+          <a:p>
+            <a:pPr marL="742950" lvl="1" indent="-285750">
+              <a:buFont typeface="Arial"/>
+              <a:buChar char="•"/>
+            </a:pPr>
+            <a:r>
+              <a:rPr lang="en-US" dirty="0" smtClean="0">
+                <a:latin typeface="Calibri" charset="0"/>
+                <a:ea typeface="Calibri" charset="0"/>
+                <a:cs typeface="Calibri" charset="0"/>
+              </a:rPr>
+              <a:t>Copy and paste </a:t>
+            </a:r>
+            <a:r>
+              <a:rPr lang="en-US" dirty="0" smtClean="0">
+                <a:latin typeface="Calibri" charset="0"/>
+                <a:ea typeface="Calibri" charset="0"/>
+                <a:cs typeface="Calibri" charset="0"/>
+              </a:rPr>
+              <a:t>lines from </a:t>
+            </a:r>
+            <a:r>
+              <a:rPr lang="en-US" dirty="0" smtClean="0">
+                <a:latin typeface="Calibri" charset="0"/>
+                <a:ea typeface="Calibri" charset="0"/>
+                <a:cs typeface="Calibri" charset="0"/>
+                <a:hlinkClick r:id="rId3"/>
+              </a:rPr>
+              <a:t>https://consequential.bitbucket.io/Developer_Preparation_Prepare_workstation.html</a:t>
+            </a:r>
+            <a:endParaRPr lang="en-US" sz="1200" dirty="0">
+              <a:latin typeface="Calibri" charset="0"/>
+              <a:ea typeface="Calibri" charset="0"/>
+              <a:cs typeface="Calibri" charset="0"/>
+            </a:endParaRPr>
+          </a:p>
+          <a:p>
+            <a:pPr marL="1428750" lvl="2" indent="-285750">
+              <a:buFont typeface="Arial"/>
+              <a:buChar char="•"/>
+            </a:pPr>
+            <a:r>
+              <a:rPr lang="en-US" dirty="0" smtClean="0">
+                <a:latin typeface="Calibri" charset="0"/>
+                <a:ea typeface="Calibri" charset="0"/>
+                <a:cs typeface="Calibri" charset="0"/>
+              </a:rPr>
+              <a:t>(The lines within white windows) which are basically configure ROS and Gazebo for operating with MiRo.</a:t>
+            </a:r>
+          </a:p>
+        </p:txBody>
+      </p:sp>
+      <p:sp>
+        <p:nvSpPr>
+          <p:cNvPr id="9" name="TextBox 8"/>
           <p:cNvSpPr txBox="1"/>
           <p:nvPr/>
         </p:nvSpPr>
@@ -9898,7 +10736,7 @@
                 <a:ea typeface="Calibri Light" charset="0"/>
                 <a:cs typeface="Calibri Light" charset="0"/>
               </a:rPr>
-              <a:t>C</a:t>
+              <a:t>MiRo</a:t>
             </a:r>
             <a:r>
               <a:rPr lang="en-GB" sz="4400" dirty="0" smtClean="0">
@@ -9906,10 +10744,10 @@
                 <a:ea typeface="Calibri Light" charset="0"/>
                 <a:cs typeface="Calibri Light" charset="0"/>
               </a:rPr>
-              <a:t>onfiguring </a:t>
-            </a:r>
-            <a:r>
-              <a:rPr lang="en-GB" sz="4400" dirty="0" smtClean="0">
+              <a:t> </a:t>
+            </a:r>
+            <a:r>
+              <a:rPr lang="en-GB" sz="4400" dirty="0" err="1" smtClean="0">
                 <a:solidFill>
                   <a:srgbClr val="C00000"/>
                 </a:solidFill>
@@ -9917,7 +10755,80 @@
                 <a:ea typeface="Calibri Light" charset="0"/>
                 <a:cs typeface="Calibri Light" charset="0"/>
               </a:rPr>
-              <a:t>MiRo</a:t>
+              <a:t>d</a:t>
+            </a:r>
+            <a:r>
+              <a:rPr lang="en-GB" sz="4400" dirty="0" err="1" smtClean="0">
+                <a:latin typeface="Calibri Light" charset="0"/>
+                <a:ea typeface="Calibri Light" charset="0"/>
+                <a:cs typeface="Calibri Light" charset="0"/>
+              </a:rPr>
+              <a:t>evkit</a:t>
+            </a:r>
+            <a:r>
+              <a:rPr lang="en-GB" sz="4400" dirty="0" smtClean="0">
+                <a:latin typeface="Calibri Light" charset="0"/>
+                <a:ea typeface="Calibri Light" charset="0"/>
+                <a:cs typeface="Calibri Light" charset="0"/>
+              </a:rPr>
+              <a:t> </a:t>
+            </a:r>
+            <a:r>
+              <a:rPr lang="en-GB" sz="4400" dirty="0" smtClean="0">
+                <a:solidFill>
+                  <a:srgbClr val="C00000"/>
+                </a:solidFill>
+                <a:latin typeface="Calibri Light" charset="0"/>
+                <a:ea typeface="Calibri Light" charset="0"/>
+                <a:cs typeface="Calibri Light" charset="0"/>
+              </a:rPr>
+              <a:t>a</a:t>
+            </a:r>
+            <a:r>
+              <a:rPr lang="en-GB" sz="4400" dirty="0" smtClean="0">
+                <a:latin typeface="Calibri Light" charset="0"/>
+                <a:ea typeface="Calibri Light" charset="0"/>
+                <a:cs typeface="Calibri Light" charset="0"/>
+              </a:rPr>
+              <a:t>nd </a:t>
+            </a:r>
+            <a:r>
+              <a:rPr lang="en-GB" sz="4400" dirty="0" smtClean="0">
+                <a:solidFill>
+                  <a:srgbClr val="C00000"/>
+                </a:solidFill>
+                <a:latin typeface="Calibri Light" charset="0"/>
+                <a:ea typeface="Calibri Light" charset="0"/>
+                <a:cs typeface="Calibri Light" charset="0"/>
+              </a:rPr>
+              <a:t>a</a:t>
+            </a:r>
+            <a:r>
+              <a:rPr lang="en-GB" sz="4400" dirty="0" smtClean="0">
+                <a:latin typeface="Calibri Light" charset="0"/>
+                <a:ea typeface="Calibri Light" charset="0"/>
+                <a:cs typeface="Calibri Light" charset="0"/>
+              </a:rPr>
+              <a:t>ndroid </a:t>
+            </a:r>
+            <a:r>
+              <a:rPr lang="en-GB" sz="4400" dirty="0" smtClean="0">
+                <a:solidFill>
+                  <a:srgbClr val="C00000"/>
+                </a:solidFill>
+                <a:latin typeface="Calibri Light" charset="0"/>
+                <a:ea typeface="Calibri Light" charset="0"/>
+                <a:cs typeface="Calibri Light" charset="0"/>
+              </a:rPr>
+              <a:t>a</a:t>
+            </a:r>
+            <a:r>
+              <a:rPr lang="en-GB" sz="4400" dirty="0" smtClean="0">
+                <a:latin typeface="Calibri Light" charset="0"/>
+                <a:ea typeface="Calibri Light" charset="0"/>
+                <a:cs typeface="Calibri Light" charset="0"/>
+              </a:rPr>
+              <a:t>pp</a:t>
             </a:r>
             <a:endParaRPr lang="en-GB" sz="4400" dirty="0">
               <a:latin typeface="Calibri Light" charset="0"/>
@@ -9929,265 +10840,57 @@
       </p:sp>
       <p:sp>
         <p:nvSpPr>
-          <p:cNvPr id="19" name="Content Placeholder 3"/>
-          <p:cNvSpPr txBox="1">
-            <a:spLocks/>
-          </p:cNvSpPr>
+          <p:cNvPr id="7" name="TextBox 6"/>
+          <p:cNvSpPr txBox="1"/>
           <p:nvPr/>
         </p:nvSpPr>
         <p:spPr>
           <a:xfrm>
-            <a:off x="457191" y="4371992"/>
-            <a:ext cx="7620000" cy="1837421"/>
+            <a:off x="1201477" y="3747607"/>
+            <a:ext cx="4987232" cy="338554"/>
           </a:xfrm>
           <a:prstGeom prst="rect">
             <a:avLst/>
           </a:prstGeom>
+          <a:noFill/>
         </p:spPr>
         <p:txBody>
-          <a:bodyPr vert="horz" lIns="91440" tIns="45720" rIns="91440" bIns="45720" rtlCol="0">
-            <a:noAutofit/>
+          <a:bodyPr wrap="square" rtlCol="0">
+            <a:spAutoFit/>
           </a:bodyPr>
-          <a:lstStyle>
-            <a:lvl1pPr marL="0" indent="0" algn="l" defTabSz="914400" rtl="0" eaLnBrk="1" latinLnBrk="0" hangingPunct="1">
-              <a:spcBef>
-                <a:spcPct val="20000"/>
-              </a:spcBef>
-              <a:spcAft>
-                <a:spcPts val="600"/>
-              </a:spcAft>
-              <a:buFont typeface="Arial" pitchFamily="34" charset="0"/>
-              <a:buNone/>
-              <a:defRPr sz="2000" b="1" kern="1200">
-                <a:solidFill>
-                  <a:schemeClr val="tx1"/>
-                </a:solidFill>
-                <a:latin typeface="+mn-lt"/>
-                <a:ea typeface="+mn-ea"/>
-                <a:cs typeface="+mn-cs"/>
-              </a:defRPr>
-            </a:lvl1pPr>
-            <a:lvl2pPr marL="457200" indent="-182880" algn="l" defTabSz="914400" rtl="0" eaLnBrk="1" latinLnBrk="0" hangingPunct="1">
-              <a:spcBef>
-                <a:spcPct val="20000"/>
-              </a:spcBef>
-              <a:buClr>
-                <a:schemeClr val="tx2"/>
-              </a:buClr>
-              <a:buFont typeface="Arial" pitchFamily="34" charset="0"/>
-              <a:buChar char="•"/>
-              <a:defRPr sz="2000" kern="1200">
-                <a:solidFill>
-                  <a:schemeClr val="tx1"/>
-                </a:solidFill>
-                <a:latin typeface="+mn-lt"/>
-                <a:ea typeface="+mn-ea"/>
-                <a:cs typeface="+mn-cs"/>
-              </a:defRPr>
-            </a:lvl2pPr>
-            <a:lvl3pPr marL="1143000" indent="-228600" algn="l" defTabSz="914400" rtl="0" eaLnBrk="1" latinLnBrk="0" hangingPunct="1">
-              <a:spcBef>
-                <a:spcPct val="20000"/>
-              </a:spcBef>
-              <a:buClr>
-                <a:schemeClr val="tx2"/>
-              </a:buClr>
-              <a:buFont typeface="Arial" pitchFamily="34" charset="0"/>
-              <a:buChar char="•"/>
-              <a:defRPr sz="1800" kern="1200">
-                <a:solidFill>
-                  <a:schemeClr val="tx1"/>
-                </a:solidFill>
-                <a:latin typeface="+mn-lt"/>
-                <a:ea typeface="+mn-ea"/>
-                <a:cs typeface="+mn-cs"/>
-              </a:defRPr>
-            </a:lvl3pPr>
-            <a:lvl4pPr marL="1600200" indent="-228600" algn="l" defTabSz="914400" rtl="0" eaLnBrk="1" latinLnBrk="0" hangingPunct="1">
-              <a:spcBef>
-                <a:spcPct val="20000"/>
-              </a:spcBef>
-              <a:buClr>
-                <a:schemeClr val="tx2"/>
-              </a:buClr>
-              <a:buFont typeface="Arial" pitchFamily="34" charset="0"/>
-              <a:buChar char="•"/>
-              <a:defRPr sz="1800" kern="1200">
-                <a:solidFill>
-                  <a:schemeClr val="tx1"/>
-                </a:solidFill>
-                <a:latin typeface="+mn-lt"/>
-                <a:ea typeface="+mn-ea"/>
-                <a:cs typeface="+mn-cs"/>
-              </a:defRPr>
-            </a:lvl4pPr>
-            <a:lvl5pPr marL="2057400" indent="-228600" algn="l" defTabSz="914400" rtl="0" eaLnBrk="1" latinLnBrk="0" hangingPunct="1">
-              <a:spcBef>
-                <a:spcPct val="20000"/>
-              </a:spcBef>
-              <a:buClr>
-                <a:schemeClr val="tx2"/>
-              </a:buClr>
-              <a:buFont typeface="Arial" pitchFamily="34" charset="0"/>
-              <a:buChar char="•"/>
-              <a:defRPr sz="1800" kern="1200" baseline="0">
-                <a:solidFill>
-                  <a:schemeClr val="tx1"/>
-                </a:solidFill>
-                <a:latin typeface="+mn-lt"/>
-                <a:ea typeface="+mn-ea"/>
-                <a:cs typeface="+mn-cs"/>
-              </a:defRPr>
-            </a:lvl5pPr>
-            <a:lvl6pPr marL="2514600" indent="-228600" algn="l" defTabSz="914400" rtl="0" eaLnBrk="1" latinLnBrk="0" hangingPunct="1">
-              <a:spcBef>
-                <a:spcPct val="20000"/>
-              </a:spcBef>
-              <a:buClr>
-                <a:schemeClr val="tx2"/>
-              </a:buClr>
-              <a:buFont typeface="Arial" pitchFamily="34" charset="0"/>
-              <a:buChar char="•"/>
-              <a:defRPr sz="1600" kern="1200">
-                <a:solidFill>
-                  <a:schemeClr val="tx1"/>
-                </a:solidFill>
-                <a:latin typeface="+mn-lt"/>
-                <a:ea typeface="+mn-ea"/>
-                <a:cs typeface="+mn-cs"/>
-              </a:defRPr>
-            </a:lvl6pPr>
-            <a:lvl7pPr marL="2971800" indent="-228600" algn="l" defTabSz="914400" rtl="0" eaLnBrk="1" latinLnBrk="0" hangingPunct="1">
-              <a:spcBef>
-                <a:spcPct val="20000"/>
-              </a:spcBef>
-              <a:buClr>
-                <a:schemeClr val="tx2"/>
-              </a:buClr>
-              <a:buFont typeface="Arial" pitchFamily="34" charset="0"/>
-              <a:buChar char="•"/>
-              <a:defRPr sz="1600" kern="1200">
-                <a:solidFill>
-                  <a:schemeClr val="tx1"/>
-                </a:solidFill>
-                <a:latin typeface="+mn-lt"/>
-                <a:ea typeface="+mn-ea"/>
-                <a:cs typeface="+mn-cs"/>
-              </a:defRPr>
-            </a:lvl7pPr>
-            <a:lvl8pPr marL="3429000" indent="-228600" algn="l" defTabSz="914400" rtl="0" eaLnBrk="1" latinLnBrk="0" hangingPunct="1">
-              <a:spcBef>
-                <a:spcPct val="20000"/>
-              </a:spcBef>
-              <a:buClr>
-                <a:schemeClr val="tx2"/>
-              </a:buClr>
-              <a:buFont typeface="Arial" pitchFamily="34" charset="0"/>
-              <a:buChar char="•"/>
-              <a:defRPr sz="1600" kern="1200">
-                <a:solidFill>
-                  <a:schemeClr val="tx1"/>
-                </a:solidFill>
-                <a:latin typeface="+mn-lt"/>
-                <a:ea typeface="+mn-ea"/>
-                <a:cs typeface="+mn-cs"/>
-              </a:defRPr>
-            </a:lvl8pPr>
-            <a:lvl9pPr marL="3886200" indent="-228600" algn="l" defTabSz="914400" rtl="0" eaLnBrk="1" latinLnBrk="0" hangingPunct="1">
-              <a:spcBef>
-                <a:spcPct val="20000"/>
-              </a:spcBef>
-              <a:buClr>
-                <a:schemeClr val="tx2"/>
-              </a:buClr>
-              <a:buFont typeface="Arial" pitchFamily="34" charset="0"/>
-              <a:buChar char="•"/>
-              <a:defRPr sz="1600" kern="1200">
-                <a:solidFill>
-                  <a:schemeClr val="tx1"/>
-                </a:solidFill>
-                <a:latin typeface="+mn-lt"/>
-                <a:ea typeface="+mn-ea"/>
-                <a:cs typeface="+mn-cs"/>
-              </a:defRPr>
-            </a:lvl9pPr>
-          </a:lstStyle>
-          <a:p>
-            <a:pPr marL="285750" indent="-285750">
-              <a:buFont typeface="Arial"/>
-              <a:buChar char="•"/>
-            </a:pPr>
-            <a:r>
-              <a:rPr lang="en-US" b="0" dirty="0" smtClean="0">
-                <a:latin typeface="Calibri" charset="0"/>
-                <a:ea typeface="Calibri" charset="0"/>
-                <a:cs typeface="Calibri" charset="0"/>
-              </a:rPr>
-              <a:t>Once inside .profile</a:t>
-            </a:r>
-          </a:p>
-          <a:p>
-            <a:pPr marL="742950" lvl="1" indent="-285750">
-              <a:buFont typeface="Arial"/>
-              <a:buChar char="•"/>
-            </a:pPr>
-            <a:r>
-              <a:rPr lang="en-US" dirty="0" smtClean="0">
-                <a:latin typeface="Calibri" charset="0"/>
-                <a:ea typeface="Calibri" charset="0"/>
-                <a:cs typeface="Calibri" charset="0"/>
-              </a:rPr>
-              <a:t>Change ROS_MASTER_IP as the IP address of your workstation. T</a:t>
-            </a:r>
-            <a:r>
-              <a:rPr lang="en-US" b="0" dirty="0" smtClean="0">
-                <a:latin typeface="Calibri" charset="0"/>
-                <a:ea typeface="Calibri" charset="0"/>
-                <a:cs typeface="Calibri" charset="0"/>
-              </a:rPr>
-              <a:t>o check the IP address of your workstation open a new </a:t>
-            </a:r>
-            <a:r>
-              <a:rPr lang="en-US" dirty="0">
-                <a:latin typeface="Calibri" charset="0"/>
-                <a:ea typeface="Calibri" charset="0"/>
-                <a:cs typeface="Calibri" charset="0"/>
-              </a:rPr>
-              <a:t>terminal window and  type </a:t>
-            </a:r>
-            <a:r>
-              <a:rPr lang="en-US" dirty="0" smtClean="0">
-                <a:latin typeface="Calibri" charset="0"/>
-                <a:ea typeface="Calibri" charset="0"/>
-                <a:cs typeface="Calibri" charset="0"/>
-              </a:rPr>
-              <a:t>in:</a:t>
-            </a:r>
-            <a:endParaRPr lang="en-US" b="0" dirty="0" smtClean="0">
-              <a:latin typeface="Calibri" charset="0"/>
-              <a:ea typeface="Calibri" charset="0"/>
-              <a:cs typeface="Calibri" charset="0"/>
-            </a:endParaRPr>
-          </a:p>
-          <a:p>
-            <a:pPr lvl="1" indent="0">
-              <a:buNone/>
-            </a:pPr>
-            <a:r>
-              <a:rPr lang="en-US" sz="1600" dirty="0">
-                <a:latin typeface="Apple Symbols" charset="0"/>
-                <a:ea typeface="Apple Symbols" charset="0"/>
-                <a:cs typeface="Apple Symbols" charset="0"/>
-              </a:rPr>
-              <a:t> </a:t>
-            </a:r>
+          <a:lstStyle/>
+          <a:p>
             <a:r>
               <a:rPr lang="en-US" sz="1600" dirty="0" smtClean="0">
                 <a:latin typeface="Apple Symbols" charset="0"/>
                 <a:ea typeface="Apple Symbols" charset="0"/>
                 <a:cs typeface="Apple Symbols" charset="0"/>
               </a:rPr>
-              <a:t>   $ </a:t>
+              <a:t>$ </a:t>
+            </a:r>
+            <a:r>
+              <a:rPr lang="pt-BR" sz="1600" dirty="0" err="1">
+                <a:latin typeface="Apple Symbols" charset="0"/>
+                <a:ea typeface="Apple Symbols" charset="0"/>
+                <a:cs typeface="Apple Symbols" charset="0"/>
+              </a:rPr>
+              <a:t>sudo</a:t>
+            </a:r>
+            <a:r>
+              <a:rPr lang="pt-BR" sz="1600" dirty="0">
+                <a:latin typeface="Apple Symbols" charset="0"/>
+                <a:ea typeface="Apple Symbols" charset="0"/>
+                <a:cs typeface="Apple Symbols" charset="0"/>
+              </a:rPr>
+              <a:t> nano </a:t>
+            </a:r>
+            <a:r>
+              <a:rPr lang="pt-BR" sz="1600" dirty="0" smtClean="0">
+                <a:latin typeface="Apple Symbols" charset="0"/>
+                <a:ea typeface="Apple Symbols" charset="0"/>
+                <a:cs typeface="Apple Symbols" charset="0"/>
+              </a:rPr>
+              <a:t>~/.</a:t>
             </a:r>
             <a:r>
               <a:rPr lang="pt-BR" sz="1600" dirty="0" err="1" smtClean="0">
@@ -10195,12 +10898,20 @@
                 <a:ea typeface="Apple Symbols" charset="0"/>
                 <a:cs typeface="Apple Symbols" charset="0"/>
               </a:rPr>
-              <a:t>ifconfig</a:t>
-            </a:r>
-            <a:endParaRPr lang="en-US" b="0" dirty="0" smtClean="0">
-              <a:latin typeface="Calibri" charset="0"/>
-              <a:ea typeface="Calibri" charset="0"/>
-              <a:cs typeface="Calibri" charset="0"/>
+              <a:t>bashrc</a:t>
+            </a:r>
+            <a:r>
+              <a:rPr lang="pt-BR" sz="1600" dirty="0" smtClean="0">
+                <a:latin typeface="Apple Symbols" charset="0"/>
+                <a:ea typeface="Apple Symbols" charset="0"/>
+                <a:cs typeface="Apple Symbols" charset="0"/>
+              </a:rPr>
+              <a:t> </a:t>
+            </a:r>
+            <a:endParaRPr lang="en-US" sz="1600" dirty="0" smtClean="0">
+              <a:latin typeface="Apple Symbols" charset="0"/>
+              <a:ea typeface="Apple Symbols" charset="0"/>
+              <a:cs typeface="Apple Symbols" charset="0"/>
             </a:endParaRPr>
           </a:p>
         </p:txBody>
@@ -10208,7 +10919,7 @@
     </p:spTree>
     <p:extLst>
       <p:ext uri="{BB962C8B-B14F-4D97-AF65-F5344CB8AC3E}">
-        <p14:creationId xmlns:p14="http://schemas.microsoft.com/office/powerpoint/2010/main" val="3852826494"/>
+        <p14:creationId xmlns:p14="http://schemas.microsoft.com/office/powerpoint/2010/main" val="2553385727"/>
       </p:ext>
     </p:extLst>
   </p:cSld>

</xml_diff>